<commit_message>
Started to add basic structure slides for presentation
</commit_message>
<xml_diff>
--- a/vortrag/evolutionary_algorithms.pptx
+++ b/vortrag/evolutionary_algorithms.pptx
@@ -10,6 +10,12 @@
   <p:sldIdLst>
     <p:sldId id="256" r:id="rId3"/>
     <p:sldId id="259" r:id="rId4"/>
+    <p:sldId id="261" r:id="rId6"/>
+    <p:sldId id="263" r:id="rId7"/>
+    <p:sldId id="265" r:id="rId8"/>
+    <p:sldId id="266" r:id="rId9"/>
+    <p:sldId id="262" r:id="rId10"/>
+    <p:sldId id="260" r:id="rId11"/>
   </p:sldIdLst>
   <p:sldSz cx="12192000" cy="6858000"/>
   <p:notesSz cx="7103745" cy="10234295"/>
@@ -459,6 +465,270 @@
 </file>
 
 <file path=ppt/notesSlides/notesSlide1.xml><?xml version="1.0" encoding="utf-8"?>
+<p:notes xmlns:a="http://schemas.openxmlformats.org/drawingml/2006/main" xmlns:r="http://schemas.openxmlformats.org/officeDocument/2006/relationships" xmlns:p="http://schemas.openxmlformats.org/presentationml/2006/main">
+  <p:cSld>
+    <p:spTree>
+      <p:nvGrpSpPr>
+        <p:cNvPr id="1" name=""/>
+        <p:cNvGrpSpPr/>
+        <p:nvPr/>
+      </p:nvGrpSpPr>
+      <p:grpSpPr/>
+      <p:sp>
+        <p:nvSpPr>
+          <p:cNvPr id="2" name="Slide Image Placeholder 1"/>
+          <p:cNvSpPr/>
+          <p:nvPr>
+            <p:ph type="sldImg" idx="2"/>
+          </p:nvPr>
+        </p:nvSpPr>
+        <p:spPr/>
+      </p:sp>
+      <p:sp>
+        <p:nvSpPr>
+          <p:cNvPr id="3" name="Text Placeholder 2"/>
+          <p:cNvSpPr/>
+          <p:nvPr>
+            <p:ph type="body" idx="3"/>
+          </p:nvPr>
+        </p:nvSpPr>
+        <p:spPr/>
+        <p:txBody>
+          <a:bodyPr/>
+          <a:p>
+            <a:endParaRPr lang="en-US"/>
+          </a:p>
+        </p:txBody>
+      </p:sp>
+    </p:spTree>
+  </p:cSld>
+  <p:clrMapOvr>
+    <a:masterClrMapping/>
+  </p:clrMapOvr>
+</p:notes>
+</file>
+
+<file path=ppt/notesSlides/notesSlide2.xml><?xml version="1.0" encoding="utf-8"?>
+<p:notes xmlns:a="http://schemas.openxmlformats.org/drawingml/2006/main" xmlns:r="http://schemas.openxmlformats.org/officeDocument/2006/relationships" xmlns:p="http://schemas.openxmlformats.org/presentationml/2006/main">
+  <p:cSld>
+    <p:spTree>
+      <p:nvGrpSpPr>
+        <p:cNvPr id="1" name=""/>
+        <p:cNvGrpSpPr/>
+        <p:nvPr/>
+      </p:nvGrpSpPr>
+      <p:grpSpPr/>
+      <p:sp>
+        <p:nvSpPr>
+          <p:cNvPr id="2" name="Slide Image Placeholder 1"/>
+          <p:cNvSpPr/>
+          <p:nvPr>
+            <p:ph type="sldImg" idx="2"/>
+          </p:nvPr>
+        </p:nvSpPr>
+        <p:spPr/>
+      </p:sp>
+      <p:sp>
+        <p:nvSpPr>
+          <p:cNvPr id="3" name="Text Placeholder 2"/>
+          <p:cNvSpPr/>
+          <p:nvPr>
+            <p:ph type="body" idx="3"/>
+          </p:nvPr>
+        </p:nvSpPr>
+        <p:spPr/>
+        <p:txBody>
+          <a:bodyPr/>
+          <a:p>
+            <a:endParaRPr lang="en-US"/>
+          </a:p>
+        </p:txBody>
+      </p:sp>
+    </p:spTree>
+  </p:cSld>
+  <p:clrMapOvr>
+    <a:masterClrMapping/>
+  </p:clrMapOvr>
+</p:notes>
+</file>
+
+<file path=ppt/notesSlides/notesSlide3.xml><?xml version="1.0" encoding="utf-8"?>
+<p:notes xmlns:a="http://schemas.openxmlformats.org/drawingml/2006/main" xmlns:r="http://schemas.openxmlformats.org/officeDocument/2006/relationships" xmlns:p="http://schemas.openxmlformats.org/presentationml/2006/main">
+  <p:cSld>
+    <p:spTree>
+      <p:nvGrpSpPr>
+        <p:cNvPr id="1" name=""/>
+        <p:cNvGrpSpPr/>
+        <p:nvPr/>
+      </p:nvGrpSpPr>
+      <p:grpSpPr/>
+      <p:sp>
+        <p:nvSpPr>
+          <p:cNvPr id="2" name="Slide Image Placeholder 1"/>
+          <p:cNvSpPr/>
+          <p:nvPr>
+            <p:ph type="sldImg" idx="2"/>
+          </p:nvPr>
+        </p:nvSpPr>
+        <p:spPr/>
+      </p:sp>
+      <p:sp>
+        <p:nvSpPr>
+          <p:cNvPr id="3" name="Text Placeholder 2"/>
+          <p:cNvSpPr/>
+          <p:nvPr>
+            <p:ph type="body" idx="3"/>
+          </p:nvPr>
+        </p:nvSpPr>
+        <p:spPr/>
+        <p:txBody>
+          <a:bodyPr/>
+          <a:p>
+            <a:endParaRPr lang="en-US"/>
+          </a:p>
+        </p:txBody>
+      </p:sp>
+    </p:spTree>
+  </p:cSld>
+  <p:clrMapOvr>
+    <a:masterClrMapping/>
+  </p:clrMapOvr>
+</p:notes>
+</file>
+
+<file path=ppt/notesSlides/notesSlide4.xml><?xml version="1.0" encoding="utf-8"?>
+<p:notes xmlns:a="http://schemas.openxmlformats.org/drawingml/2006/main" xmlns:r="http://schemas.openxmlformats.org/officeDocument/2006/relationships" xmlns:p="http://schemas.openxmlformats.org/presentationml/2006/main">
+  <p:cSld>
+    <p:spTree>
+      <p:nvGrpSpPr>
+        <p:cNvPr id="1" name=""/>
+        <p:cNvGrpSpPr/>
+        <p:nvPr/>
+      </p:nvGrpSpPr>
+      <p:grpSpPr/>
+      <p:sp>
+        <p:nvSpPr>
+          <p:cNvPr id="2" name="Slide Image Placeholder 1"/>
+          <p:cNvSpPr/>
+          <p:nvPr>
+            <p:ph type="sldImg" idx="2"/>
+          </p:nvPr>
+        </p:nvSpPr>
+        <p:spPr/>
+      </p:sp>
+      <p:sp>
+        <p:nvSpPr>
+          <p:cNvPr id="3" name="Text Placeholder 2"/>
+          <p:cNvSpPr/>
+          <p:nvPr>
+            <p:ph type="body" idx="3"/>
+          </p:nvPr>
+        </p:nvSpPr>
+        <p:spPr/>
+        <p:txBody>
+          <a:bodyPr/>
+          <a:p>
+            <a:endParaRPr lang="en-US"/>
+          </a:p>
+        </p:txBody>
+      </p:sp>
+    </p:spTree>
+  </p:cSld>
+  <p:clrMapOvr>
+    <a:masterClrMapping/>
+  </p:clrMapOvr>
+</p:notes>
+</file>
+
+<file path=ppt/notesSlides/notesSlide5.xml><?xml version="1.0" encoding="utf-8"?>
+<p:notes xmlns:a="http://schemas.openxmlformats.org/drawingml/2006/main" xmlns:r="http://schemas.openxmlformats.org/officeDocument/2006/relationships" xmlns:p="http://schemas.openxmlformats.org/presentationml/2006/main">
+  <p:cSld>
+    <p:spTree>
+      <p:nvGrpSpPr>
+        <p:cNvPr id="1" name=""/>
+        <p:cNvGrpSpPr/>
+        <p:nvPr/>
+      </p:nvGrpSpPr>
+      <p:grpSpPr/>
+      <p:sp>
+        <p:nvSpPr>
+          <p:cNvPr id="2" name="Slide Image Placeholder 1"/>
+          <p:cNvSpPr/>
+          <p:nvPr>
+            <p:ph type="sldImg" idx="2"/>
+          </p:nvPr>
+        </p:nvSpPr>
+        <p:spPr/>
+      </p:sp>
+      <p:sp>
+        <p:nvSpPr>
+          <p:cNvPr id="3" name="Text Placeholder 2"/>
+          <p:cNvSpPr/>
+          <p:nvPr>
+            <p:ph type="body" idx="3"/>
+          </p:nvPr>
+        </p:nvSpPr>
+        <p:spPr/>
+        <p:txBody>
+          <a:bodyPr/>
+          <a:p>
+            <a:endParaRPr lang="en-US"/>
+          </a:p>
+        </p:txBody>
+      </p:sp>
+    </p:spTree>
+  </p:cSld>
+  <p:clrMapOvr>
+    <a:masterClrMapping/>
+  </p:clrMapOvr>
+</p:notes>
+</file>
+
+<file path=ppt/notesSlides/notesSlide6.xml><?xml version="1.0" encoding="utf-8"?>
+<p:notes xmlns:a="http://schemas.openxmlformats.org/drawingml/2006/main" xmlns:r="http://schemas.openxmlformats.org/officeDocument/2006/relationships" xmlns:p="http://schemas.openxmlformats.org/presentationml/2006/main">
+  <p:cSld>
+    <p:spTree>
+      <p:nvGrpSpPr>
+        <p:cNvPr id="1" name=""/>
+        <p:cNvGrpSpPr/>
+        <p:nvPr/>
+      </p:nvGrpSpPr>
+      <p:grpSpPr/>
+      <p:sp>
+        <p:nvSpPr>
+          <p:cNvPr id="2" name="Slide Image Placeholder 1"/>
+          <p:cNvSpPr/>
+          <p:nvPr>
+            <p:ph type="sldImg" idx="2"/>
+          </p:nvPr>
+        </p:nvSpPr>
+        <p:spPr/>
+      </p:sp>
+      <p:sp>
+        <p:nvSpPr>
+          <p:cNvPr id="3" name="Text Placeholder 2"/>
+          <p:cNvSpPr/>
+          <p:nvPr>
+            <p:ph type="body" idx="3"/>
+          </p:nvPr>
+        </p:nvSpPr>
+        <p:spPr/>
+        <p:txBody>
+          <a:bodyPr/>
+          <a:p>
+            <a:endParaRPr lang="en-US"/>
+          </a:p>
+        </p:txBody>
+      </p:sp>
+    </p:spTree>
+  </p:cSld>
+  <p:clrMapOvr>
+    <a:masterClrMapping/>
+  </p:clrMapOvr>
+</p:notes>
+</file>
+
+<file path=ppt/notesSlides/notesSlide7.xml><?xml version="1.0" encoding="utf-8"?>
 <p:notes xmlns:a="http://schemas.openxmlformats.org/drawingml/2006/main" xmlns:r="http://schemas.openxmlformats.org/officeDocument/2006/relationships" xmlns:p="http://schemas.openxmlformats.org/presentationml/2006/main">
   <p:cSld>
     <p:spTree>
@@ -3055,10 +3325,10 @@
           </a:bodyPr>
           <a:p>
             <a:r>
-              <a:rPr lang="" altLang="en-US"/>
+              <a:rPr lang="en-US" altLang="en-US"/>
               <a:t>Evolutionärer Optimierungsalgorithmen</a:t>
             </a:r>
-            <a:endParaRPr lang="" altLang="en-US"/>
+            <a:endParaRPr lang="en-US" altLang="en-US"/>
           </a:p>
         </p:txBody>
       </p:sp>
@@ -3082,24 +3352,24 @@
           <a:bodyPr/>
           <a:p>
             <a:r>
-              <a:rPr lang="" altLang="en-US"/>
+              <a:rPr lang="en-US" altLang="en-US"/>
               <a:t>14.01.19</a:t>
             </a:r>
-            <a:endParaRPr lang="" altLang="en-US"/>
-          </a:p>
-          <a:p>
-            <a:r>
-              <a:rPr lang="" altLang="en-US"/>
+            <a:endParaRPr lang="en-US" altLang="en-US"/>
+          </a:p>
+          <a:p>
+            <a:r>
+              <a:rPr lang="en-US" altLang="en-US"/>
               <a:t>Federico Ramírez Villagrana</a:t>
             </a:r>
-            <a:endParaRPr lang="" altLang="en-US"/>
-          </a:p>
-          <a:p>
-            <a:r>
-              <a:rPr lang="" altLang="en-US"/>
+            <a:endParaRPr lang="en-US" altLang="en-US"/>
+          </a:p>
+          <a:p>
+            <a:r>
+              <a:rPr lang="en-US" altLang="en-US"/>
               <a:t>Universität Hamburg</a:t>
             </a:r>
-            <a:endParaRPr lang="" altLang="en-US"/>
+            <a:endParaRPr lang="en-US" altLang="en-US"/>
           </a:p>
         </p:txBody>
       </p:sp>
@@ -3177,7 +3447,723 @@
         <p:txBody>
           <a:bodyPr/>
           <a:p>
-            <a:endParaRPr lang="en-US"/>
+            <a:r>
+              <a:rPr lang="" altLang="en-US" sz="2400"/>
+              <a:t>Optimierung</a:t>
+            </a:r>
+            <a:endParaRPr lang="" altLang="en-US" sz="2400"/>
+          </a:p>
+          <a:p>
+            <a:pPr lvl="1"/>
+            <a:r>
+              <a:rPr lang="" altLang="en-US" sz="2055"/>
+              <a:t>Wichtigkeit</a:t>
+            </a:r>
+            <a:endParaRPr lang="" altLang="en-US" sz="2055"/>
+          </a:p>
+          <a:p>
+            <a:pPr lvl="1"/>
+            <a:r>
+              <a:rPr lang="" altLang="en-US" sz="2055"/>
+              <a:t>Schwierigketi</a:t>
+            </a:r>
+            <a:endParaRPr lang="" altLang="en-US" sz="2055"/>
+          </a:p>
+          <a:p>
+            <a:pPr lvl="0"/>
+            <a:r>
+              <a:rPr lang="" altLang="en-US" sz="2400"/>
+              <a:t>Evolutionäre Algorithmen</a:t>
+            </a:r>
+            <a:endParaRPr lang="" altLang="en-US" sz="2790"/>
+          </a:p>
+          <a:p>
+            <a:pPr lvl="1"/>
+            <a:r>
+              <a:rPr lang="" altLang="en-US" sz="2060"/>
+              <a:t>Definition</a:t>
+            </a:r>
+            <a:endParaRPr lang="" altLang="en-US" sz="2060"/>
+          </a:p>
+          <a:p>
+            <a:pPr lvl="1"/>
+            <a:r>
+              <a:rPr lang="" altLang="en-US" sz="2060"/>
+              <a:t>Eigenschaften</a:t>
+            </a:r>
+            <a:endParaRPr lang="" altLang="en-US" sz="2060"/>
+          </a:p>
+          <a:p>
+            <a:pPr lvl="1"/>
+            <a:r>
+              <a:rPr lang="" altLang="en-US" sz="2060"/>
+              <a:t>Beispiele</a:t>
+            </a:r>
+            <a:endParaRPr lang="" altLang="en-US" sz="2060"/>
+          </a:p>
+          <a:p>
+            <a:pPr lvl="0"/>
+            <a:r>
+              <a:rPr lang="" altLang="en-US" sz="2400"/>
+              <a:t>Evolutionäre Algorithmen und Optimierung - Vor- und Nachteile</a:t>
+            </a:r>
+            <a:endParaRPr lang="" altLang="en-US" sz="2400"/>
+          </a:p>
+          <a:p>
+            <a:pPr lvl="0"/>
+            <a:r>
+              <a:rPr lang="" altLang="en-US" sz="2400"/>
+              <a:t>Zusammenfasung</a:t>
+            </a:r>
+            <a:endParaRPr lang="" altLang="en-US" sz="2400"/>
+          </a:p>
+        </p:txBody>
+      </p:sp>
+      <p:sp>
+        <p:nvSpPr>
+          <p:cNvPr id="5" name="Slide Number Placeholder 4"/>
+          <p:cNvSpPr>
+            <a:spLocks noGrp="1"/>
+          </p:cNvSpPr>
+          <p:nvPr>
+            <p:ph type="sldNum" sz="quarter" idx="12"/>
+          </p:nvPr>
+        </p:nvSpPr>
+        <p:spPr/>
+        <p:txBody>
+          <a:bodyPr/>
+          <a:p>
+            <a:fld id="{B3561BA9-CDCF-4958-B8AB-66F3BF063E13}" type="slidenum">
+              <a:rPr lang="en-US" smtClean="0"/>
+            </a:fld>
+            <a:endParaRPr lang="en-US"/>
+          </a:p>
+        </p:txBody>
+      </p:sp>
+      <p:pic>
+        <p:nvPicPr>
+          <p:cNvPr id="7" name="Picture 6" descr="uhh_logo_klein"/>
+          <p:cNvPicPr>
+            <a:picLocks noChangeAspect="1"/>
+          </p:cNvPicPr>
+          <p:nvPr/>
+        </p:nvPicPr>
+        <p:blipFill>
+          <a:blip r:embed="rId1"/>
+          <a:stretch>
+            <a:fillRect/>
+          </a:stretch>
+        </p:blipFill>
+        <p:spPr>
+          <a:xfrm>
+            <a:off x="127000" y="6119495"/>
+            <a:ext cx="602615" cy="601980"/>
+          </a:xfrm>
+          <a:prstGeom prst="rect">
+            <a:avLst/>
+          </a:prstGeom>
+        </p:spPr>
+      </p:pic>
+    </p:spTree>
+  </p:cSld>
+  <p:clrMapOvr>
+    <a:masterClrMapping/>
+  </p:clrMapOvr>
+</p:sld>
+</file>
+
+<file path=ppt/slides/slide3.xml><?xml version="1.0" encoding="utf-8"?>
+<p:sld xmlns:a="http://schemas.openxmlformats.org/drawingml/2006/main" xmlns:r="http://schemas.openxmlformats.org/officeDocument/2006/relationships" xmlns:p="http://schemas.openxmlformats.org/presentationml/2006/main">
+  <p:cSld>
+    <p:spTree>
+      <p:nvGrpSpPr>
+        <p:cNvPr id="1" name=""/>
+        <p:cNvGrpSpPr/>
+        <p:nvPr/>
+      </p:nvGrpSpPr>
+      <p:grpSpPr/>
+      <p:sp>
+        <p:nvSpPr>
+          <p:cNvPr id="2" name="Title 1"/>
+          <p:cNvSpPr>
+            <a:spLocks noGrp="1"/>
+          </p:cNvSpPr>
+          <p:nvPr>
+            <p:ph type="title"/>
+          </p:nvPr>
+        </p:nvSpPr>
+        <p:spPr/>
+        <p:txBody>
+          <a:bodyPr/>
+          <a:p>
+            <a:r>
+              <a:rPr lang="" altLang="en-US"/>
+              <a:t>Was ist Optimierung?</a:t>
+            </a:r>
+            <a:endParaRPr lang="" altLang="en-US"/>
+          </a:p>
+        </p:txBody>
+      </p:sp>
+      <p:sp>
+        <p:nvSpPr>
+          <p:cNvPr id="3" name="Content Placeholder 2"/>
+          <p:cNvSpPr>
+            <a:spLocks noGrp="1"/>
+          </p:cNvSpPr>
+          <p:nvPr>
+            <p:ph idx="1"/>
+          </p:nvPr>
+        </p:nvSpPr>
+        <p:spPr/>
+        <p:txBody>
+          <a:bodyPr/>
+          <a:p>
+            <a:endParaRPr lang="en-US"/>
+          </a:p>
+        </p:txBody>
+      </p:sp>
+      <p:sp>
+        <p:nvSpPr>
+          <p:cNvPr id="5" name="Slide Number Placeholder 4"/>
+          <p:cNvSpPr>
+            <a:spLocks noGrp="1"/>
+          </p:cNvSpPr>
+          <p:nvPr>
+            <p:ph type="sldNum" sz="quarter" idx="12"/>
+          </p:nvPr>
+        </p:nvSpPr>
+        <p:spPr/>
+        <p:txBody>
+          <a:bodyPr/>
+          <a:p>
+            <a:fld id="{B3561BA9-CDCF-4958-B8AB-66F3BF063E13}" type="slidenum">
+              <a:rPr lang="en-US" smtClean="0"/>
+            </a:fld>
+            <a:endParaRPr lang="en-US"/>
+          </a:p>
+        </p:txBody>
+      </p:sp>
+      <p:pic>
+        <p:nvPicPr>
+          <p:cNvPr id="7" name="Picture 6" descr="uhh_logo_klein"/>
+          <p:cNvPicPr>
+            <a:picLocks noChangeAspect="1"/>
+          </p:cNvPicPr>
+          <p:nvPr/>
+        </p:nvPicPr>
+        <p:blipFill>
+          <a:blip r:embed="rId1"/>
+          <a:stretch>
+            <a:fillRect/>
+          </a:stretch>
+        </p:blipFill>
+        <p:spPr>
+          <a:xfrm>
+            <a:off x="127000" y="6119495"/>
+            <a:ext cx="602615" cy="601980"/>
+          </a:xfrm>
+          <a:prstGeom prst="rect">
+            <a:avLst/>
+          </a:prstGeom>
+        </p:spPr>
+      </p:pic>
+    </p:spTree>
+  </p:cSld>
+  <p:clrMapOvr>
+    <a:masterClrMapping/>
+  </p:clrMapOvr>
+</p:sld>
+</file>
+
+<file path=ppt/slides/slide4.xml><?xml version="1.0" encoding="utf-8"?>
+<p:sld xmlns:a="http://schemas.openxmlformats.org/drawingml/2006/main" xmlns:r="http://schemas.openxmlformats.org/officeDocument/2006/relationships" xmlns:p="http://schemas.openxmlformats.org/presentationml/2006/main">
+  <p:cSld>
+    <p:spTree>
+      <p:nvGrpSpPr>
+        <p:cNvPr id="1" name=""/>
+        <p:cNvGrpSpPr/>
+        <p:nvPr/>
+      </p:nvGrpSpPr>
+      <p:grpSpPr/>
+      <p:sp>
+        <p:nvSpPr>
+          <p:cNvPr id="2" name="Title 1"/>
+          <p:cNvSpPr>
+            <a:spLocks noGrp="1"/>
+          </p:cNvSpPr>
+          <p:nvPr>
+            <p:ph type="title"/>
+          </p:nvPr>
+        </p:nvSpPr>
+        <p:spPr/>
+        <p:txBody>
+          <a:bodyPr/>
+          <a:p>
+            <a:r>
+              <a:rPr lang="" altLang="en-US"/>
+              <a:t>Warum ist Optimierung wichtig?</a:t>
+            </a:r>
+            <a:endParaRPr lang="" altLang="en-US"/>
+          </a:p>
+        </p:txBody>
+      </p:sp>
+      <p:sp>
+        <p:nvSpPr>
+          <p:cNvPr id="3" name="Content Placeholder 2"/>
+          <p:cNvSpPr>
+            <a:spLocks noGrp="1"/>
+          </p:cNvSpPr>
+          <p:nvPr>
+            <p:ph idx="1"/>
+          </p:nvPr>
+        </p:nvSpPr>
+        <p:spPr/>
+        <p:txBody>
+          <a:bodyPr/>
+          <a:p>
+            <a:endParaRPr lang="en-US"/>
+          </a:p>
+        </p:txBody>
+      </p:sp>
+      <p:sp>
+        <p:nvSpPr>
+          <p:cNvPr id="5" name="Slide Number Placeholder 4"/>
+          <p:cNvSpPr>
+            <a:spLocks noGrp="1"/>
+          </p:cNvSpPr>
+          <p:nvPr>
+            <p:ph type="sldNum" sz="quarter" idx="12"/>
+          </p:nvPr>
+        </p:nvSpPr>
+        <p:spPr/>
+        <p:txBody>
+          <a:bodyPr/>
+          <a:p>
+            <a:fld id="{B3561BA9-CDCF-4958-B8AB-66F3BF063E13}" type="slidenum">
+              <a:rPr lang="en-US" smtClean="0"/>
+            </a:fld>
+            <a:endParaRPr lang="en-US"/>
+          </a:p>
+        </p:txBody>
+      </p:sp>
+      <p:pic>
+        <p:nvPicPr>
+          <p:cNvPr id="7" name="Picture 6" descr="uhh_logo_klein"/>
+          <p:cNvPicPr>
+            <a:picLocks noChangeAspect="1"/>
+          </p:cNvPicPr>
+          <p:nvPr/>
+        </p:nvPicPr>
+        <p:blipFill>
+          <a:blip r:embed="rId1"/>
+          <a:stretch>
+            <a:fillRect/>
+          </a:stretch>
+        </p:blipFill>
+        <p:spPr>
+          <a:xfrm>
+            <a:off x="127000" y="6119495"/>
+            <a:ext cx="602615" cy="601980"/>
+          </a:xfrm>
+          <a:prstGeom prst="rect">
+            <a:avLst/>
+          </a:prstGeom>
+        </p:spPr>
+      </p:pic>
+    </p:spTree>
+  </p:cSld>
+  <p:clrMapOvr>
+    <a:masterClrMapping/>
+  </p:clrMapOvr>
+</p:sld>
+</file>
+
+<file path=ppt/slides/slide5.xml><?xml version="1.0" encoding="utf-8"?>
+<p:sld xmlns:a="http://schemas.openxmlformats.org/drawingml/2006/main" xmlns:r="http://schemas.openxmlformats.org/officeDocument/2006/relationships" xmlns:p="http://schemas.openxmlformats.org/presentationml/2006/main">
+  <p:cSld>
+    <p:spTree>
+      <p:nvGrpSpPr>
+        <p:cNvPr id="1" name=""/>
+        <p:cNvGrpSpPr/>
+        <p:nvPr/>
+      </p:nvGrpSpPr>
+      <p:grpSpPr/>
+      <p:sp>
+        <p:nvSpPr>
+          <p:cNvPr id="2" name="Title 1"/>
+          <p:cNvSpPr>
+            <a:spLocks noGrp="1"/>
+          </p:cNvSpPr>
+          <p:nvPr>
+            <p:ph type="title"/>
+          </p:nvPr>
+        </p:nvSpPr>
+        <p:spPr/>
+        <p:txBody>
+          <a:bodyPr/>
+          <a:p>
+            <a:r>
+              <a:rPr lang="en-US" altLang="en-US"/>
+              <a:t>Warum ist Optimierung </a:t>
+            </a:r>
+            <a:r>
+              <a:rPr lang="" altLang="en-US"/>
+              <a:t>schwierig</a:t>
+            </a:r>
+            <a:r>
+              <a:rPr lang="en-US" altLang="en-US"/>
+              <a:t>?</a:t>
+            </a:r>
+            <a:endParaRPr lang="en-US" altLang="en-US"/>
+          </a:p>
+        </p:txBody>
+      </p:sp>
+      <p:sp>
+        <p:nvSpPr>
+          <p:cNvPr id="3" name="Content Placeholder 2"/>
+          <p:cNvSpPr>
+            <a:spLocks noGrp="1"/>
+          </p:cNvSpPr>
+          <p:nvPr>
+            <p:ph idx="1"/>
+          </p:nvPr>
+        </p:nvSpPr>
+        <p:spPr/>
+        <p:txBody>
+          <a:bodyPr/>
+          <a:p>
+            <a:endParaRPr lang="en-US"/>
+          </a:p>
+        </p:txBody>
+      </p:sp>
+      <p:sp>
+        <p:nvSpPr>
+          <p:cNvPr id="5" name="Slide Number Placeholder 4"/>
+          <p:cNvSpPr>
+            <a:spLocks noGrp="1"/>
+          </p:cNvSpPr>
+          <p:nvPr>
+            <p:ph type="sldNum" sz="quarter" idx="12"/>
+          </p:nvPr>
+        </p:nvSpPr>
+        <p:spPr/>
+        <p:txBody>
+          <a:bodyPr/>
+          <a:p>
+            <a:fld id="{B3561BA9-CDCF-4958-B8AB-66F3BF063E13}" type="slidenum">
+              <a:rPr lang="en-US" smtClean="0"/>
+            </a:fld>
+            <a:endParaRPr lang="en-US"/>
+          </a:p>
+        </p:txBody>
+      </p:sp>
+      <p:pic>
+        <p:nvPicPr>
+          <p:cNvPr id="7" name="Picture 6" descr="uhh_logo_klein"/>
+          <p:cNvPicPr>
+            <a:picLocks noChangeAspect="1"/>
+          </p:cNvPicPr>
+          <p:nvPr/>
+        </p:nvPicPr>
+        <p:blipFill>
+          <a:blip r:embed="rId1"/>
+          <a:stretch>
+            <a:fillRect/>
+          </a:stretch>
+        </p:blipFill>
+        <p:spPr>
+          <a:xfrm>
+            <a:off x="127000" y="6119495"/>
+            <a:ext cx="602615" cy="601980"/>
+          </a:xfrm>
+          <a:prstGeom prst="rect">
+            <a:avLst/>
+          </a:prstGeom>
+        </p:spPr>
+      </p:pic>
+    </p:spTree>
+  </p:cSld>
+  <p:clrMapOvr>
+    <a:masterClrMapping/>
+  </p:clrMapOvr>
+</p:sld>
+</file>
+
+<file path=ppt/slides/slide6.xml><?xml version="1.0" encoding="utf-8"?>
+<p:sld xmlns:a="http://schemas.openxmlformats.org/drawingml/2006/main" xmlns:r="http://schemas.openxmlformats.org/officeDocument/2006/relationships" xmlns:p="http://schemas.openxmlformats.org/presentationml/2006/main">
+  <p:cSld>
+    <p:spTree>
+      <p:nvGrpSpPr>
+        <p:cNvPr id="1" name=""/>
+        <p:cNvGrpSpPr/>
+        <p:nvPr/>
+      </p:nvGrpSpPr>
+      <p:grpSpPr/>
+      <p:sp>
+        <p:nvSpPr>
+          <p:cNvPr id="2" name="Title 1"/>
+          <p:cNvSpPr>
+            <a:spLocks noGrp="1"/>
+          </p:cNvSpPr>
+          <p:nvPr>
+            <p:ph type="title"/>
+          </p:nvPr>
+        </p:nvSpPr>
+        <p:spPr/>
+        <p:txBody>
+          <a:bodyPr>
+            <a:normAutofit fontScale="90000"/>
+          </a:bodyPr>
+          <a:p>
+            <a:r>
+              <a:rPr lang="" altLang="en-US"/>
+              <a:t>Was ist ein ,,evolutionärer” Algorithmus?</a:t>
+            </a:r>
+            <a:endParaRPr lang="" altLang="en-US"/>
+          </a:p>
+        </p:txBody>
+      </p:sp>
+      <p:sp>
+        <p:nvSpPr>
+          <p:cNvPr id="3" name="Content Placeholder 2"/>
+          <p:cNvSpPr>
+            <a:spLocks noGrp="1"/>
+          </p:cNvSpPr>
+          <p:nvPr>
+            <p:ph idx="1"/>
+          </p:nvPr>
+        </p:nvSpPr>
+        <p:spPr/>
+        <p:txBody>
+          <a:bodyPr/>
+          <a:p>
+            <a:pPr lvl="1"/>
+            <a:endParaRPr lang="en-US"/>
+          </a:p>
+        </p:txBody>
+      </p:sp>
+      <p:sp>
+        <p:nvSpPr>
+          <p:cNvPr id="5" name="Slide Number Placeholder 4"/>
+          <p:cNvSpPr>
+            <a:spLocks noGrp="1"/>
+          </p:cNvSpPr>
+          <p:nvPr>
+            <p:ph type="sldNum" sz="quarter" idx="12"/>
+          </p:nvPr>
+        </p:nvSpPr>
+        <p:spPr/>
+        <p:txBody>
+          <a:bodyPr/>
+          <a:p>
+            <a:fld id="{B3561BA9-CDCF-4958-B8AB-66F3BF063E13}" type="slidenum">
+              <a:rPr lang="en-US" smtClean="0"/>
+            </a:fld>
+            <a:endParaRPr lang="en-US"/>
+          </a:p>
+        </p:txBody>
+      </p:sp>
+      <p:pic>
+        <p:nvPicPr>
+          <p:cNvPr id="7" name="Picture 6" descr="uhh_logo_klein"/>
+          <p:cNvPicPr>
+            <a:picLocks noChangeAspect="1"/>
+          </p:cNvPicPr>
+          <p:nvPr/>
+        </p:nvPicPr>
+        <p:blipFill>
+          <a:blip r:embed="rId1"/>
+          <a:stretch>
+            <a:fillRect/>
+          </a:stretch>
+        </p:blipFill>
+        <p:spPr>
+          <a:xfrm>
+            <a:off x="127000" y="6119495"/>
+            <a:ext cx="602615" cy="601980"/>
+          </a:xfrm>
+          <a:prstGeom prst="rect">
+            <a:avLst/>
+          </a:prstGeom>
+        </p:spPr>
+      </p:pic>
+    </p:spTree>
+  </p:cSld>
+  <p:clrMapOvr>
+    <a:masterClrMapping/>
+  </p:clrMapOvr>
+</p:sld>
+</file>
+
+<file path=ppt/slides/slide7.xml><?xml version="1.0" encoding="utf-8"?>
+<p:sld xmlns:a="http://schemas.openxmlformats.org/drawingml/2006/main" xmlns:r="http://schemas.openxmlformats.org/officeDocument/2006/relationships" xmlns:p="http://schemas.openxmlformats.org/presentationml/2006/main">
+  <p:cSld>
+    <p:spTree>
+      <p:nvGrpSpPr>
+        <p:cNvPr id="1" name=""/>
+        <p:cNvGrpSpPr/>
+        <p:nvPr/>
+      </p:nvGrpSpPr>
+      <p:grpSpPr/>
+      <p:sp>
+        <p:nvSpPr>
+          <p:cNvPr id="2" name="Title 1"/>
+          <p:cNvSpPr>
+            <a:spLocks noGrp="1"/>
+          </p:cNvSpPr>
+          <p:nvPr>
+            <p:ph type="title"/>
+          </p:nvPr>
+        </p:nvSpPr>
+        <p:spPr/>
+        <p:txBody>
+          <a:bodyPr/>
+          <a:p>
+            <a:r>
+              <a:rPr lang="en-US"/>
+              <a:t>EA und Optimierung - Vorteile</a:t>
+            </a:r>
+            <a:endParaRPr lang="en-US"/>
+          </a:p>
+        </p:txBody>
+      </p:sp>
+      <p:sp>
+        <p:nvSpPr>
+          <p:cNvPr id="3" name="Content Placeholder 2"/>
+          <p:cNvSpPr>
+            <a:spLocks noGrp="1"/>
+          </p:cNvSpPr>
+          <p:nvPr>
+            <p:ph idx="1"/>
+          </p:nvPr>
+        </p:nvSpPr>
+        <p:spPr/>
+        <p:txBody>
+          <a:bodyPr/>
+          <a:p>
+            <a:endParaRPr lang="en-US"/>
+          </a:p>
+        </p:txBody>
+      </p:sp>
+      <p:sp>
+        <p:nvSpPr>
+          <p:cNvPr id="5" name="Slide Number Placeholder 4"/>
+          <p:cNvSpPr>
+            <a:spLocks noGrp="1"/>
+          </p:cNvSpPr>
+          <p:nvPr>
+            <p:ph type="sldNum" sz="quarter" idx="12"/>
+          </p:nvPr>
+        </p:nvSpPr>
+        <p:spPr/>
+        <p:txBody>
+          <a:bodyPr/>
+          <a:p>
+            <a:fld id="{B3561BA9-CDCF-4958-B8AB-66F3BF063E13}" type="slidenum">
+              <a:rPr lang="en-US" smtClean="0"/>
+            </a:fld>
+            <a:endParaRPr lang="en-US"/>
+          </a:p>
+        </p:txBody>
+      </p:sp>
+      <p:pic>
+        <p:nvPicPr>
+          <p:cNvPr id="7" name="Picture 6" descr="uhh_logo_klein"/>
+          <p:cNvPicPr>
+            <a:picLocks noChangeAspect="1"/>
+          </p:cNvPicPr>
+          <p:nvPr/>
+        </p:nvPicPr>
+        <p:blipFill>
+          <a:blip r:embed="rId1"/>
+          <a:stretch>
+            <a:fillRect/>
+          </a:stretch>
+        </p:blipFill>
+        <p:spPr>
+          <a:xfrm>
+            <a:off x="127000" y="6119495"/>
+            <a:ext cx="602615" cy="601980"/>
+          </a:xfrm>
+          <a:prstGeom prst="rect">
+            <a:avLst/>
+          </a:prstGeom>
+        </p:spPr>
+      </p:pic>
+    </p:spTree>
+  </p:cSld>
+  <p:clrMapOvr>
+    <a:masterClrMapping/>
+  </p:clrMapOvr>
+</p:sld>
+</file>
+
+<file path=ppt/slides/slide8.xml><?xml version="1.0" encoding="utf-8"?>
+<p:sld xmlns:a="http://schemas.openxmlformats.org/drawingml/2006/main" xmlns:r="http://schemas.openxmlformats.org/officeDocument/2006/relationships" xmlns:p="http://schemas.openxmlformats.org/presentationml/2006/main">
+  <p:cSld>
+    <p:spTree>
+      <p:nvGrpSpPr>
+        <p:cNvPr id="1" name=""/>
+        <p:cNvGrpSpPr/>
+        <p:nvPr/>
+      </p:nvGrpSpPr>
+      <p:grpSpPr/>
+      <p:sp>
+        <p:nvSpPr>
+          <p:cNvPr id="2" name="Title 1"/>
+          <p:cNvSpPr>
+            <a:spLocks noGrp="1"/>
+          </p:cNvSpPr>
+          <p:nvPr>
+            <p:ph type="title"/>
+          </p:nvPr>
+        </p:nvSpPr>
+        <p:spPr/>
+        <p:txBody>
+          <a:bodyPr/>
+          <a:p>
+            <a:r>
+              <a:rPr lang="en-US"/>
+              <a:t>EA und Optimierung - </a:t>
+            </a:r>
+            <a:r>
+              <a:rPr lang="" altLang="en-US"/>
+              <a:t>Nachteile</a:t>
+            </a:r>
+            <a:endParaRPr lang="" altLang="en-US"/>
+          </a:p>
+        </p:txBody>
+      </p:sp>
+      <p:sp>
+        <p:nvSpPr>
+          <p:cNvPr id="3" name="Content Placeholder 2"/>
+          <p:cNvSpPr>
+            <a:spLocks noGrp="1"/>
+          </p:cNvSpPr>
+          <p:nvPr>
+            <p:ph idx="1"/>
+          </p:nvPr>
+        </p:nvSpPr>
+        <p:spPr/>
+        <p:txBody>
+          <a:bodyPr/>
+          <a:p>
+            <a:r>
+              <a:rPr lang="" altLang="en-US" b="1"/>
+              <a:t>Gute</a:t>
+            </a:r>
+            <a:r>
+              <a:rPr lang="" altLang="en-US"/>
+              <a:t> Lösungen, wahrscheinlich nicht die beste.</a:t>
+            </a:r>
+            <a:endParaRPr lang="" altLang="en-US"/>
+          </a:p>
+          <a:p>
+            <a:r>
+              <a:rPr lang="" altLang="en-US"/>
+              <a:t>Parameter Einstellung.</a:t>
+            </a:r>
+            <a:endParaRPr lang="" altLang="en-US"/>
           </a:p>
         </p:txBody>
       </p:sp>

</xml_diff>

<commit_message>
Added images for PSO algorithm and continued with presentation
</commit_message>
<xml_diff>
--- a/vortrag/evolutionary_algorithms.pptx
+++ b/vortrag/evolutionary_algorithms.pptx
@@ -11,11 +11,23 @@
     <p:sldId id="256" r:id="rId3"/>
     <p:sldId id="259" r:id="rId4"/>
     <p:sldId id="261" r:id="rId6"/>
-    <p:sldId id="263" r:id="rId7"/>
+    <p:sldId id="281" r:id="rId7"/>
     <p:sldId id="265" r:id="rId8"/>
-    <p:sldId id="266" r:id="rId9"/>
-    <p:sldId id="262" r:id="rId10"/>
-    <p:sldId id="260" r:id="rId11"/>
+    <p:sldId id="269" r:id="rId9"/>
+    <p:sldId id="270" r:id="rId10"/>
+    <p:sldId id="271" r:id="rId11"/>
+    <p:sldId id="266" r:id="rId12"/>
+    <p:sldId id="272" r:id="rId13"/>
+    <p:sldId id="273" r:id="rId14"/>
+    <p:sldId id="279" r:id="rId15"/>
+    <p:sldId id="274" r:id="rId16"/>
+    <p:sldId id="280" r:id="rId17"/>
+    <p:sldId id="275" r:id="rId18"/>
+    <p:sldId id="278" r:id="rId19"/>
+    <p:sldId id="262" r:id="rId20"/>
+    <p:sldId id="276" r:id="rId21"/>
+    <p:sldId id="260" r:id="rId22"/>
+    <p:sldId id="277" r:id="rId23"/>
   </p:sldIdLst>
   <p:sldSz cx="12192000" cy="6858000"/>
   <p:notesSz cx="7103745" cy="10234295"/>
@@ -508,6 +520,446 @@
 </p:notes>
 </file>
 
+<file path=ppt/notesSlides/notesSlide10.xml><?xml version="1.0" encoding="utf-8"?>
+<p:notes xmlns:a="http://schemas.openxmlformats.org/drawingml/2006/main" xmlns:r="http://schemas.openxmlformats.org/officeDocument/2006/relationships" xmlns:p="http://schemas.openxmlformats.org/presentationml/2006/main">
+  <p:cSld>
+    <p:spTree>
+      <p:nvGrpSpPr>
+        <p:cNvPr id="1" name=""/>
+        <p:cNvGrpSpPr/>
+        <p:nvPr/>
+      </p:nvGrpSpPr>
+      <p:grpSpPr/>
+      <p:sp>
+        <p:nvSpPr>
+          <p:cNvPr id="2" name="Slide Image Placeholder 1"/>
+          <p:cNvSpPr/>
+          <p:nvPr>
+            <p:ph type="sldImg" idx="2"/>
+          </p:nvPr>
+        </p:nvSpPr>
+        <p:spPr/>
+      </p:sp>
+      <p:sp>
+        <p:nvSpPr>
+          <p:cNvPr id="3" name="Text Placeholder 2"/>
+          <p:cNvSpPr/>
+          <p:nvPr>
+            <p:ph type="body" idx="3"/>
+          </p:nvPr>
+        </p:nvSpPr>
+        <p:spPr/>
+        <p:txBody>
+          <a:bodyPr/>
+          <a:p>
+            <a:endParaRPr lang="en-US"/>
+          </a:p>
+        </p:txBody>
+      </p:sp>
+    </p:spTree>
+  </p:cSld>
+  <p:clrMapOvr>
+    <a:masterClrMapping/>
+  </p:clrMapOvr>
+</p:notes>
+</file>
+
+<file path=ppt/notesSlides/notesSlide11.xml><?xml version="1.0" encoding="utf-8"?>
+<p:notes xmlns:a="http://schemas.openxmlformats.org/drawingml/2006/main" xmlns:r="http://schemas.openxmlformats.org/officeDocument/2006/relationships" xmlns:p="http://schemas.openxmlformats.org/presentationml/2006/main">
+  <p:cSld>
+    <p:spTree>
+      <p:nvGrpSpPr>
+        <p:cNvPr id="1" name=""/>
+        <p:cNvGrpSpPr/>
+        <p:nvPr/>
+      </p:nvGrpSpPr>
+      <p:grpSpPr/>
+      <p:sp>
+        <p:nvSpPr>
+          <p:cNvPr id="2" name="Slide Image Placeholder 1"/>
+          <p:cNvSpPr/>
+          <p:nvPr>
+            <p:ph type="sldImg" idx="2"/>
+          </p:nvPr>
+        </p:nvSpPr>
+        <p:spPr/>
+      </p:sp>
+      <p:sp>
+        <p:nvSpPr>
+          <p:cNvPr id="3" name="Text Placeholder 2"/>
+          <p:cNvSpPr/>
+          <p:nvPr>
+            <p:ph type="body" idx="3"/>
+          </p:nvPr>
+        </p:nvSpPr>
+        <p:spPr/>
+        <p:txBody>
+          <a:bodyPr/>
+          <a:p>
+            <a:endParaRPr lang="en-US"/>
+          </a:p>
+        </p:txBody>
+      </p:sp>
+    </p:spTree>
+  </p:cSld>
+  <p:clrMapOvr>
+    <a:masterClrMapping/>
+  </p:clrMapOvr>
+</p:notes>
+</file>
+
+<file path=ppt/notesSlides/notesSlide12.xml><?xml version="1.0" encoding="utf-8"?>
+<p:notes xmlns:a="http://schemas.openxmlformats.org/drawingml/2006/main" xmlns:r="http://schemas.openxmlformats.org/officeDocument/2006/relationships" xmlns:p="http://schemas.openxmlformats.org/presentationml/2006/main">
+  <p:cSld>
+    <p:spTree>
+      <p:nvGrpSpPr>
+        <p:cNvPr id="1" name=""/>
+        <p:cNvGrpSpPr/>
+        <p:nvPr/>
+      </p:nvGrpSpPr>
+      <p:grpSpPr/>
+      <p:sp>
+        <p:nvSpPr>
+          <p:cNvPr id="2" name="Slide Image Placeholder 1"/>
+          <p:cNvSpPr/>
+          <p:nvPr>
+            <p:ph type="sldImg" idx="2"/>
+          </p:nvPr>
+        </p:nvSpPr>
+        <p:spPr/>
+      </p:sp>
+      <p:sp>
+        <p:nvSpPr>
+          <p:cNvPr id="3" name="Text Placeholder 2"/>
+          <p:cNvSpPr/>
+          <p:nvPr>
+            <p:ph type="body" idx="3"/>
+          </p:nvPr>
+        </p:nvSpPr>
+        <p:spPr/>
+        <p:txBody>
+          <a:bodyPr/>
+          <a:p>
+            <a:endParaRPr lang="en-US"/>
+          </a:p>
+        </p:txBody>
+      </p:sp>
+    </p:spTree>
+  </p:cSld>
+  <p:clrMapOvr>
+    <a:masterClrMapping/>
+  </p:clrMapOvr>
+</p:notes>
+</file>
+
+<file path=ppt/notesSlides/notesSlide13.xml><?xml version="1.0" encoding="utf-8"?>
+<p:notes xmlns:a="http://schemas.openxmlformats.org/drawingml/2006/main" xmlns:r="http://schemas.openxmlformats.org/officeDocument/2006/relationships" xmlns:p="http://schemas.openxmlformats.org/presentationml/2006/main">
+  <p:cSld>
+    <p:spTree>
+      <p:nvGrpSpPr>
+        <p:cNvPr id="1" name=""/>
+        <p:cNvGrpSpPr/>
+        <p:nvPr/>
+      </p:nvGrpSpPr>
+      <p:grpSpPr/>
+      <p:sp>
+        <p:nvSpPr>
+          <p:cNvPr id="2" name="Slide Image Placeholder 1"/>
+          <p:cNvSpPr/>
+          <p:nvPr>
+            <p:ph type="sldImg" idx="2"/>
+          </p:nvPr>
+        </p:nvSpPr>
+        <p:spPr/>
+      </p:sp>
+      <p:sp>
+        <p:nvSpPr>
+          <p:cNvPr id="3" name="Text Placeholder 2"/>
+          <p:cNvSpPr/>
+          <p:nvPr>
+            <p:ph type="body" idx="3"/>
+          </p:nvPr>
+        </p:nvSpPr>
+        <p:spPr/>
+        <p:txBody>
+          <a:bodyPr/>
+          <a:p>
+            <a:endParaRPr lang="en-US"/>
+          </a:p>
+        </p:txBody>
+      </p:sp>
+    </p:spTree>
+  </p:cSld>
+  <p:clrMapOvr>
+    <a:masterClrMapping/>
+  </p:clrMapOvr>
+</p:notes>
+</file>
+
+<file path=ppt/notesSlides/notesSlide14.xml><?xml version="1.0" encoding="utf-8"?>
+<p:notes xmlns:a="http://schemas.openxmlformats.org/drawingml/2006/main" xmlns:r="http://schemas.openxmlformats.org/officeDocument/2006/relationships" xmlns:p="http://schemas.openxmlformats.org/presentationml/2006/main">
+  <p:cSld>
+    <p:spTree>
+      <p:nvGrpSpPr>
+        <p:cNvPr id="1" name=""/>
+        <p:cNvGrpSpPr/>
+        <p:nvPr/>
+      </p:nvGrpSpPr>
+      <p:grpSpPr/>
+      <p:sp>
+        <p:nvSpPr>
+          <p:cNvPr id="2" name="Slide Image Placeholder 1"/>
+          <p:cNvSpPr/>
+          <p:nvPr>
+            <p:ph type="sldImg" idx="2"/>
+          </p:nvPr>
+        </p:nvSpPr>
+        <p:spPr/>
+      </p:sp>
+      <p:sp>
+        <p:nvSpPr>
+          <p:cNvPr id="3" name="Text Placeholder 2"/>
+          <p:cNvSpPr/>
+          <p:nvPr>
+            <p:ph type="body" idx="3"/>
+          </p:nvPr>
+        </p:nvSpPr>
+        <p:spPr/>
+        <p:txBody>
+          <a:bodyPr/>
+          <a:p>
+            <a:endParaRPr lang="en-US"/>
+          </a:p>
+        </p:txBody>
+      </p:sp>
+    </p:spTree>
+  </p:cSld>
+  <p:clrMapOvr>
+    <a:masterClrMapping/>
+  </p:clrMapOvr>
+</p:notes>
+</file>
+
+<file path=ppt/notesSlides/notesSlide15.xml><?xml version="1.0" encoding="utf-8"?>
+<p:notes xmlns:a="http://schemas.openxmlformats.org/drawingml/2006/main" xmlns:r="http://schemas.openxmlformats.org/officeDocument/2006/relationships" xmlns:p="http://schemas.openxmlformats.org/presentationml/2006/main">
+  <p:cSld>
+    <p:spTree>
+      <p:nvGrpSpPr>
+        <p:cNvPr id="1" name=""/>
+        <p:cNvGrpSpPr/>
+        <p:nvPr/>
+      </p:nvGrpSpPr>
+      <p:grpSpPr/>
+      <p:sp>
+        <p:nvSpPr>
+          <p:cNvPr id="2" name="Slide Image Placeholder 1"/>
+          <p:cNvSpPr/>
+          <p:nvPr>
+            <p:ph type="sldImg" idx="2"/>
+          </p:nvPr>
+        </p:nvSpPr>
+        <p:spPr/>
+      </p:sp>
+      <p:sp>
+        <p:nvSpPr>
+          <p:cNvPr id="3" name="Text Placeholder 2"/>
+          <p:cNvSpPr/>
+          <p:nvPr>
+            <p:ph type="body" idx="3"/>
+          </p:nvPr>
+        </p:nvSpPr>
+        <p:spPr/>
+        <p:txBody>
+          <a:bodyPr/>
+          <a:p>
+            <a:endParaRPr lang="en-US"/>
+          </a:p>
+        </p:txBody>
+      </p:sp>
+    </p:spTree>
+  </p:cSld>
+  <p:clrMapOvr>
+    <a:masterClrMapping/>
+  </p:clrMapOvr>
+</p:notes>
+</file>
+
+<file path=ppt/notesSlides/notesSlide16.xml><?xml version="1.0" encoding="utf-8"?>
+<p:notes xmlns:a="http://schemas.openxmlformats.org/drawingml/2006/main" xmlns:r="http://schemas.openxmlformats.org/officeDocument/2006/relationships" xmlns:p="http://schemas.openxmlformats.org/presentationml/2006/main">
+  <p:cSld>
+    <p:spTree>
+      <p:nvGrpSpPr>
+        <p:cNvPr id="1" name=""/>
+        <p:cNvGrpSpPr/>
+        <p:nvPr/>
+      </p:nvGrpSpPr>
+      <p:grpSpPr/>
+      <p:sp>
+        <p:nvSpPr>
+          <p:cNvPr id="2" name="Slide Image Placeholder 1"/>
+          <p:cNvSpPr/>
+          <p:nvPr>
+            <p:ph type="sldImg" idx="2"/>
+          </p:nvPr>
+        </p:nvSpPr>
+        <p:spPr/>
+      </p:sp>
+      <p:sp>
+        <p:nvSpPr>
+          <p:cNvPr id="3" name="Text Placeholder 2"/>
+          <p:cNvSpPr/>
+          <p:nvPr>
+            <p:ph type="body" idx="3"/>
+          </p:nvPr>
+        </p:nvSpPr>
+        <p:spPr/>
+        <p:txBody>
+          <a:bodyPr/>
+          <a:p>
+            <a:endParaRPr lang="en-US"/>
+          </a:p>
+        </p:txBody>
+      </p:sp>
+    </p:spTree>
+  </p:cSld>
+  <p:clrMapOvr>
+    <a:masterClrMapping/>
+  </p:clrMapOvr>
+</p:notes>
+</file>
+
+<file path=ppt/notesSlides/notesSlide17.xml><?xml version="1.0" encoding="utf-8"?>
+<p:notes xmlns:a="http://schemas.openxmlformats.org/drawingml/2006/main" xmlns:r="http://schemas.openxmlformats.org/officeDocument/2006/relationships" xmlns:p="http://schemas.openxmlformats.org/presentationml/2006/main">
+  <p:cSld>
+    <p:spTree>
+      <p:nvGrpSpPr>
+        <p:cNvPr id="1" name=""/>
+        <p:cNvGrpSpPr/>
+        <p:nvPr/>
+      </p:nvGrpSpPr>
+      <p:grpSpPr/>
+      <p:sp>
+        <p:nvSpPr>
+          <p:cNvPr id="2" name="Slide Image Placeholder 1"/>
+          <p:cNvSpPr/>
+          <p:nvPr>
+            <p:ph type="sldImg" idx="2"/>
+          </p:nvPr>
+        </p:nvSpPr>
+        <p:spPr/>
+      </p:sp>
+      <p:sp>
+        <p:nvSpPr>
+          <p:cNvPr id="3" name="Text Placeholder 2"/>
+          <p:cNvSpPr/>
+          <p:nvPr>
+            <p:ph type="body" idx="3"/>
+          </p:nvPr>
+        </p:nvSpPr>
+        <p:spPr/>
+        <p:txBody>
+          <a:bodyPr/>
+          <a:p>
+            <a:endParaRPr lang="en-US"/>
+          </a:p>
+        </p:txBody>
+      </p:sp>
+    </p:spTree>
+  </p:cSld>
+  <p:clrMapOvr>
+    <a:masterClrMapping/>
+  </p:clrMapOvr>
+</p:notes>
+</file>
+
+<file path=ppt/notesSlides/notesSlide18.xml><?xml version="1.0" encoding="utf-8"?>
+<p:notes xmlns:a="http://schemas.openxmlformats.org/drawingml/2006/main" xmlns:r="http://schemas.openxmlformats.org/officeDocument/2006/relationships" xmlns:p="http://schemas.openxmlformats.org/presentationml/2006/main">
+  <p:cSld>
+    <p:spTree>
+      <p:nvGrpSpPr>
+        <p:cNvPr id="1" name=""/>
+        <p:cNvGrpSpPr/>
+        <p:nvPr/>
+      </p:nvGrpSpPr>
+      <p:grpSpPr/>
+      <p:sp>
+        <p:nvSpPr>
+          <p:cNvPr id="2" name="Slide Image Placeholder 1"/>
+          <p:cNvSpPr/>
+          <p:nvPr>
+            <p:ph type="sldImg" idx="2"/>
+          </p:nvPr>
+        </p:nvSpPr>
+        <p:spPr/>
+      </p:sp>
+      <p:sp>
+        <p:nvSpPr>
+          <p:cNvPr id="3" name="Text Placeholder 2"/>
+          <p:cNvSpPr/>
+          <p:nvPr>
+            <p:ph type="body" idx="3"/>
+          </p:nvPr>
+        </p:nvSpPr>
+        <p:spPr/>
+        <p:txBody>
+          <a:bodyPr/>
+          <a:p>
+            <a:endParaRPr lang="en-US"/>
+          </a:p>
+        </p:txBody>
+      </p:sp>
+    </p:spTree>
+  </p:cSld>
+  <p:clrMapOvr>
+    <a:masterClrMapping/>
+  </p:clrMapOvr>
+</p:notes>
+</file>
+
+<file path=ppt/notesSlides/notesSlide19.xml><?xml version="1.0" encoding="utf-8"?>
+<p:notes xmlns:a="http://schemas.openxmlformats.org/drawingml/2006/main" xmlns:r="http://schemas.openxmlformats.org/officeDocument/2006/relationships" xmlns:p="http://schemas.openxmlformats.org/presentationml/2006/main">
+  <p:cSld>
+    <p:spTree>
+      <p:nvGrpSpPr>
+        <p:cNvPr id="1" name=""/>
+        <p:cNvGrpSpPr/>
+        <p:nvPr/>
+      </p:nvGrpSpPr>
+      <p:grpSpPr/>
+      <p:sp>
+        <p:nvSpPr>
+          <p:cNvPr id="2" name="Slide Image Placeholder 1"/>
+          <p:cNvSpPr/>
+          <p:nvPr>
+            <p:ph type="sldImg" idx="2"/>
+          </p:nvPr>
+        </p:nvSpPr>
+        <p:spPr/>
+      </p:sp>
+      <p:sp>
+        <p:nvSpPr>
+          <p:cNvPr id="3" name="Text Placeholder 2"/>
+          <p:cNvSpPr/>
+          <p:nvPr>
+            <p:ph type="body" idx="3"/>
+          </p:nvPr>
+        </p:nvSpPr>
+        <p:spPr/>
+        <p:txBody>
+          <a:bodyPr/>
+          <a:p>
+            <a:endParaRPr lang="en-US"/>
+          </a:p>
+        </p:txBody>
+      </p:sp>
+    </p:spTree>
+  </p:cSld>
+  <p:clrMapOvr>
+    <a:masterClrMapping/>
+  </p:clrMapOvr>
+</p:notes>
+</file>
+
 <file path=ppt/notesSlides/notesSlide2.xml><?xml version="1.0" encoding="utf-8"?>
 <p:notes xmlns:a="http://schemas.openxmlformats.org/drawingml/2006/main" xmlns:r="http://schemas.openxmlformats.org/officeDocument/2006/relationships" xmlns:p="http://schemas.openxmlformats.org/presentationml/2006/main">
   <p:cSld>
@@ -729,6 +1181,94 @@
 </file>
 
 <file path=ppt/notesSlides/notesSlide7.xml><?xml version="1.0" encoding="utf-8"?>
+<p:notes xmlns:a="http://schemas.openxmlformats.org/drawingml/2006/main" xmlns:r="http://schemas.openxmlformats.org/officeDocument/2006/relationships" xmlns:p="http://schemas.openxmlformats.org/presentationml/2006/main">
+  <p:cSld>
+    <p:spTree>
+      <p:nvGrpSpPr>
+        <p:cNvPr id="1" name=""/>
+        <p:cNvGrpSpPr/>
+        <p:nvPr/>
+      </p:nvGrpSpPr>
+      <p:grpSpPr/>
+      <p:sp>
+        <p:nvSpPr>
+          <p:cNvPr id="2" name="Slide Image Placeholder 1"/>
+          <p:cNvSpPr/>
+          <p:nvPr>
+            <p:ph type="sldImg" idx="2"/>
+          </p:nvPr>
+        </p:nvSpPr>
+        <p:spPr/>
+      </p:sp>
+      <p:sp>
+        <p:nvSpPr>
+          <p:cNvPr id="3" name="Text Placeholder 2"/>
+          <p:cNvSpPr/>
+          <p:nvPr>
+            <p:ph type="body" idx="3"/>
+          </p:nvPr>
+        </p:nvSpPr>
+        <p:spPr/>
+        <p:txBody>
+          <a:bodyPr/>
+          <a:p>
+            <a:endParaRPr lang="en-US"/>
+          </a:p>
+        </p:txBody>
+      </p:sp>
+    </p:spTree>
+  </p:cSld>
+  <p:clrMapOvr>
+    <a:masterClrMapping/>
+  </p:clrMapOvr>
+</p:notes>
+</file>
+
+<file path=ppt/notesSlides/notesSlide8.xml><?xml version="1.0" encoding="utf-8"?>
+<p:notes xmlns:a="http://schemas.openxmlformats.org/drawingml/2006/main" xmlns:r="http://schemas.openxmlformats.org/officeDocument/2006/relationships" xmlns:p="http://schemas.openxmlformats.org/presentationml/2006/main">
+  <p:cSld>
+    <p:spTree>
+      <p:nvGrpSpPr>
+        <p:cNvPr id="1" name=""/>
+        <p:cNvGrpSpPr/>
+        <p:nvPr/>
+      </p:nvGrpSpPr>
+      <p:grpSpPr/>
+      <p:sp>
+        <p:nvSpPr>
+          <p:cNvPr id="2" name="Slide Image Placeholder 1"/>
+          <p:cNvSpPr/>
+          <p:nvPr>
+            <p:ph type="sldImg" idx="2"/>
+          </p:nvPr>
+        </p:nvSpPr>
+        <p:spPr/>
+      </p:sp>
+      <p:sp>
+        <p:nvSpPr>
+          <p:cNvPr id="3" name="Text Placeholder 2"/>
+          <p:cNvSpPr/>
+          <p:nvPr>
+            <p:ph type="body" idx="3"/>
+          </p:nvPr>
+        </p:nvSpPr>
+        <p:spPr/>
+        <p:txBody>
+          <a:bodyPr/>
+          <a:p>
+            <a:endParaRPr lang="en-US"/>
+          </a:p>
+        </p:txBody>
+      </p:sp>
+    </p:spTree>
+  </p:cSld>
+  <p:clrMapOvr>
+    <a:masterClrMapping/>
+  </p:clrMapOvr>
+</p:notes>
+</file>
+
+<file path=ppt/notesSlides/notesSlide9.xml><?xml version="1.0" encoding="utf-8"?>
 <p:notes xmlns:a="http://schemas.openxmlformats.org/drawingml/2006/main" xmlns:r="http://schemas.openxmlformats.org/officeDocument/2006/relationships" xmlns:p="http://schemas.openxmlformats.org/presentationml/2006/main">
   <p:cSld>
     <p:spTree>
@@ -3405,6 +3945,1912 @@
 </p:sld>
 </file>
 
+<file path=ppt/slides/slide10.xml><?xml version="1.0" encoding="utf-8"?>
+<p:sld xmlns:a="http://schemas.openxmlformats.org/drawingml/2006/main" xmlns:r="http://schemas.openxmlformats.org/officeDocument/2006/relationships" xmlns:p="http://schemas.openxmlformats.org/presentationml/2006/main">
+  <p:cSld>
+    <p:spTree>
+      <p:nvGrpSpPr>
+        <p:cNvPr id="1" name=""/>
+        <p:cNvGrpSpPr/>
+        <p:nvPr/>
+      </p:nvGrpSpPr>
+      <p:grpSpPr/>
+      <p:sp>
+        <p:nvSpPr>
+          <p:cNvPr id="2" name="Title 1"/>
+          <p:cNvSpPr>
+            <a:spLocks noGrp="1"/>
+          </p:cNvSpPr>
+          <p:nvPr>
+            <p:ph type="title"/>
+          </p:nvPr>
+        </p:nvSpPr>
+        <p:spPr/>
+        <p:txBody>
+          <a:bodyPr>
+            <a:normAutofit/>
+          </a:bodyPr>
+          <a:p>
+            <a:r>
+              <a:rPr lang="" altLang="en-US"/>
+              <a:t>Merkmale der EA</a:t>
+            </a:r>
+            <a:endParaRPr lang="" altLang="en-US"/>
+          </a:p>
+        </p:txBody>
+      </p:sp>
+      <p:sp>
+        <p:nvSpPr>
+          <p:cNvPr id="3" name="Content Placeholder 2"/>
+          <p:cNvSpPr>
+            <a:spLocks noGrp="1"/>
+          </p:cNvSpPr>
+          <p:nvPr>
+            <p:ph idx="1"/>
+          </p:nvPr>
+        </p:nvSpPr>
+        <p:spPr/>
+        <p:txBody>
+          <a:bodyPr/>
+          <a:p>
+            <a:pPr lvl="1"/>
+            <a:endParaRPr lang="en-US"/>
+          </a:p>
+        </p:txBody>
+      </p:sp>
+      <p:sp>
+        <p:nvSpPr>
+          <p:cNvPr id="5" name="Slide Number Placeholder 4"/>
+          <p:cNvSpPr>
+            <a:spLocks noGrp="1"/>
+          </p:cNvSpPr>
+          <p:nvPr>
+            <p:ph type="sldNum" sz="quarter" idx="12"/>
+          </p:nvPr>
+        </p:nvSpPr>
+        <p:spPr/>
+        <p:txBody>
+          <a:bodyPr/>
+          <a:p>
+            <a:fld id="{B3561BA9-CDCF-4958-B8AB-66F3BF063E13}" type="slidenum">
+              <a:rPr lang="en-US" smtClean="0"/>
+            </a:fld>
+            <a:endParaRPr lang="en-US"/>
+          </a:p>
+        </p:txBody>
+      </p:sp>
+      <p:pic>
+        <p:nvPicPr>
+          <p:cNvPr id="7" name="Picture 6" descr="uhh_logo_klein"/>
+          <p:cNvPicPr>
+            <a:picLocks noChangeAspect="1"/>
+          </p:cNvPicPr>
+          <p:nvPr/>
+        </p:nvPicPr>
+        <p:blipFill>
+          <a:blip r:embed="rId1"/>
+          <a:stretch>
+            <a:fillRect/>
+          </a:stretch>
+        </p:blipFill>
+        <p:spPr>
+          <a:xfrm>
+            <a:off x="127000" y="6119495"/>
+            <a:ext cx="602615" cy="601980"/>
+          </a:xfrm>
+          <a:prstGeom prst="rect">
+            <a:avLst/>
+          </a:prstGeom>
+        </p:spPr>
+      </p:pic>
+    </p:spTree>
+  </p:cSld>
+  <p:clrMapOvr>
+    <a:masterClrMapping/>
+  </p:clrMapOvr>
+</p:sld>
+</file>
+
+<file path=ppt/slides/slide11.xml><?xml version="1.0" encoding="utf-8"?>
+<p:sld xmlns:a="http://schemas.openxmlformats.org/drawingml/2006/main" xmlns:r="http://schemas.openxmlformats.org/officeDocument/2006/relationships" xmlns:p="http://schemas.openxmlformats.org/presentationml/2006/main">
+  <p:cSld>
+    <p:spTree>
+      <p:nvGrpSpPr>
+        <p:cNvPr id="1" name=""/>
+        <p:cNvGrpSpPr/>
+        <p:nvPr/>
+      </p:nvGrpSpPr>
+      <p:grpSpPr/>
+      <p:sp>
+        <p:nvSpPr>
+          <p:cNvPr id="2" name="Title 1"/>
+          <p:cNvSpPr>
+            <a:spLocks noGrp="1"/>
+          </p:cNvSpPr>
+          <p:nvPr>
+            <p:ph type="title"/>
+          </p:nvPr>
+        </p:nvSpPr>
+        <p:spPr/>
+        <p:txBody>
+          <a:bodyPr>
+            <a:normAutofit/>
+          </a:bodyPr>
+          <a:p>
+            <a:r>
+              <a:rPr lang="en-US" altLang="en-US"/>
+              <a:t>Genetische Algorithmen</a:t>
+            </a:r>
+            <a:endParaRPr lang="en-US" altLang="en-US"/>
+          </a:p>
+        </p:txBody>
+      </p:sp>
+      <p:sp>
+        <p:nvSpPr>
+          <p:cNvPr id="3" name="Content Placeholder 2"/>
+          <p:cNvSpPr>
+            <a:spLocks noGrp="1"/>
+          </p:cNvSpPr>
+          <p:nvPr>
+            <p:ph idx="1"/>
+          </p:nvPr>
+        </p:nvSpPr>
+        <p:spPr/>
+        <p:txBody>
+          <a:bodyPr/>
+          <a:p>
+            <a:pPr lvl="1"/>
+            <a:endParaRPr lang="en-US"/>
+          </a:p>
+        </p:txBody>
+      </p:sp>
+      <p:sp>
+        <p:nvSpPr>
+          <p:cNvPr id="5" name="Slide Number Placeholder 4"/>
+          <p:cNvSpPr>
+            <a:spLocks noGrp="1"/>
+          </p:cNvSpPr>
+          <p:nvPr>
+            <p:ph type="sldNum" sz="quarter" idx="12"/>
+          </p:nvPr>
+        </p:nvSpPr>
+        <p:spPr/>
+        <p:txBody>
+          <a:bodyPr/>
+          <a:p>
+            <a:fld id="{B3561BA9-CDCF-4958-B8AB-66F3BF063E13}" type="slidenum">
+              <a:rPr lang="en-US" smtClean="0"/>
+            </a:fld>
+            <a:endParaRPr lang="en-US"/>
+          </a:p>
+        </p:txBody>
+      </p:sp>
+      <p:pic>
+        <p:nvPicPr>
+          <p:cNvPr id="7" name="Picture 6" descr="uhh_logo_klein"/>
+          <p:cNvPicPr>
+            <a:picLocks noChangeAspect="1"/>
+          </p:cNvPicPr>
+          <p:nvPr/>
+        </p:nvPicPr>
+        <p:blipFill>
+          <a:blip r:embed="rId1"/>
+          <a:stretch>
+            <a:fillRect/>
+          </a:stretch>
+        </p:blipFill>
+        <p:spPr>
+          <a:xfrm>
+            <a:off x="127000" y="6119495"/>
+            <a:ext cx="602615" cy="601980"/>
+          </a:xfrm>
+          <a:prstGeom prst="rect">
+            <a:avLst/>
+          </a:prstGeom>
+        </p:spPr>
+      </p:pic>
+    </p:spTree>
+  </p:cSld>
+  <p:clrMapOvr>
+    <a:masterClrMapping/>
+  </p:clrMapOvr>
+</p:sld>
+</file>
+
+<file path=ppt/slides/slide12.xml><?xml version="1.0" encoding="utf-8"?>
+<p:sld xmlns:a="http://schemas.openxmlformats.org/drawingml/2006/main" xmlns:r="http://schemas.openxmlformats.org/officeDocument/2006/relationships" xmlns:p="http://schemas.openxmlformats.org/presentationml/2006/main">
+  <p:cSld>
+    <p:spTree>
+      <p:nvGrpSpPr>
+        <p:cNvPr id="1" name=""/>
+        <p:cNvGrpSpPr/>
+        <p:nvPr/>
+      </p:nvGrpSpPr>
+      <p:grpSpPr/>
+      <p:sp>
+        <p:nvSpPr>
+          <p:cNvPr id="2" name="Title 1"/>
+          <p:cNvSpPr>
+            <a:spLocks noGrp="1"/>
+          </p:cNvSpPr>
+          <p:nvPr>
+            <p:ph type="title"/>
+          </p:nvPr>
+        </p:nvSpPr>
+        <p:spPr/>
+        <p:txBody>
+          <a:bodyPr>
+            <a:normAutofit/>
+          </a:bodyPr>
+          <a:p>
+            <a:r>
+              <a:rPr lang="en-US" altLang="en-US"/>
+              <a:t>Genetische Algorithmen </a:t>
+            </a:r>
+            <a:r>
+              <a:rPr lang="" altLang="en-US"/>
+              <a:t>(fort.)</a:t>
+            </a:r>
+            <a:endParaRPr lang="" altLang="en-US"/>
+          </a:p>
+        </p:txBody>
+      </p:sp>
+      <p:sp>
+        <p:nvSpPr>
+          <p:cNvPr id="3" name="Content Placeholder 2"/>
+          <p:cNvSpPr>
+            <a:spLocks noGrp="1"/>
+          </p:cNvSpPr>
+          <p:nvPr>
+            <p:ph idx="1"/>
+          </p:nvPr>
+        </p:nvSpPr>
+        <p:spPr/>
+        <p:txBody>
+          <a:bodyPr/>
+          <a:p>
+            <a:pPr lvl="1"/>
+            <a:endParaRPr lang="en-US"/>
+          </a:p>
+        </p:txBody>
+      </p:sp>
+      <p:sp>
+        <p:nvSpPr>
+          <p:cNvPr id="5" name="Slide Number Placeholder 4"/>
+          <p:cNvSpPr>
+            <a:spLocks noGrp="1"/>
+          </p:cNvSpPr>
+          <p:nvPr>
+            <p:ph type="sldNum" sz="quarter" idx="12"/>
+          </p:nvPr>
+        </p:nvSpPr>
+        <p:spPr/>
+        <p:txBody>
+          <a:bodyPr/>
+          <a:p>
+            <a:fld id="{B3561BA9-CDCF-4958-B8AB-66F3BF063E13}" type="slidenum">
+              <a:rPr lang="en-US" smtClean="0"/>
+            </a:fld>
+            <a:endParaRPr lang="en-US"/>
+          </a:p>
+        </p:txBody>
+      </p:sp>
+      <p:pic>
+        <p:nvPicPr>
+          <p:cNvPr id="7" name="Picture 6" descr="uhh_logo_klein"/>
+          <p:cNvPicPr>
+            <a:picLocks noChangeAspect="1"/>
+          </p:cNvPicPr>
+          <p:nvPr/>
+        </p:nvPicPr>
+        <p:blipFill>
+          <a:blip r:embed="rId1"/>
+          <a:stretch>
+            <a:fillRect/>
+          </a:stretch>
+        </p:blipFill>
+        <p:spPr>
+          <a:xfrm>
+            <a:off x="127000" y="6119495"/>
+            <a:ext cx="602615" cy="601980"/>
+          </a:xfrm>
+          <a:prstGeom prst="rect">
+            <a:avLst/>
+          </a:prstGeom>
+        </p:spPr>
+      </p:pic>
+    </p:spTree>
+  </p:cSld>
+  <p:clrMapOvr>
+    <a:masterClrMapping/>
+  </p:clrMapOvr>
+</p:sld>
+</file>
+
+<file path=ppt/slides/slide13.xml><?xml version="1.0" encoding="utf-8"?>
+<p:sld xmlns:a="http://schemas.openxmlformats.org/drawingml/2006/main" xmlns:r="http://schemas.openxmlformats.org/officeDocument/2006/relationships" xmlns:p="http://schemas.openxmlformats.org/presentationml/2006/main">
+  <p:cSld>
+    <p:spTree>
+      <p:nvGrpSpPr>
+        <p:cNvPr id="1" name=""/>
+        <p:cNvGrpSpPr/>
+        <p:nvPr/>
+      </p:nvGrpSpPr>
+      <p:grpSpPr/>
+      <p:sp>
+        <p:nvSpPr>
+          <p:cNvPr id="2" name="Title 1"/>
+          <p:cNvSpPr>
+            <a:spLocks noGrp="1"/>
+          </p:cNvSpPr>
+          <p:nvPr>
+            <p:ph type="title"/>
+          </p:nvPr>
+        </p:nvSpPr>
+        <p:spPr/>
+        <p:txBody>
+          <a:bodyPr>
+            <a:normAutofit/>
+          </a:bodyPr>
+          <a:p>
+            <a:r>
+              <a:rPr lang="en-US" altLang="en-US"/>
+              <a:t>Partikelschwarmoptimierung</a:t>
+            </a:r>
+            <a:endParaRPr lang="en-US" altLang="en-US"/>
+          </a:p>
+        </p:txBody>
+      </p:sp>
+      <p:sp>
+        <p:nvSpPr>
+          <p:cNvPr id="3" name="Content Placeholder 2"/>
+          <p:cNvSpPr>
+            <a:spLocks noGrp="1"/>
+          </p:cNvSpPr>
+          <p:nvPr>
+            <p:ph idx="1"/>
+          </p:nvPr>
+        </p:nvSpPr>
+        <p:spPr/>
+        <p:txBody>
+          <a:bodyPr/>
+          <a:p>
+            <a:pPr lvl="1"/>
+            <a:endParaRPr lang="en-US"/>
+          </a:p>
+        </p:txBody>
+      </p:sp>
+      <p:sp>
+        <p:nvSpPr>
+          <p:cNvPr id="5" name="Slide Number Placeholder 4"/>
+          <p:cNvSpPr>
+            <a:spLocks noGrp="1"/>
+          </p:cNvSpPr>
+          <p:nvPr>
+            <p:ph type="sldNum" sz="quarter" idx="12"/>
+          </p:nvPr>
+        </p:nvSpPr>
+        <p:spPr/>
+        <p:txBody>
+          <a:bodyPr/>
+          <a:p>
+            <a:fld id="{B3561BA9-CDCF-4958-B8AB-66F3BF063E13}" type="slidenum">
+              <a:rPr lang="en-US" smtClean="0"/>
+            </a:fld>
+            <a:endParaRPr lang="en-US"/>
+          </a:p>
+        </p:txBody>
+      </p:sp>
+      <p:pic>
+        <p:nvPicPr>
+          <p:cNvPr id="7" name="Picture 6" descr="uhh_logo_klein"/>
+          <p:cNvPicPr>
+            <a:picLocks noChangeAspect="1"/>
+          </p:cNvPicPr>
+          <p:nvPr/>
+        </p:nvPicPr>
+        <p:blipFill>
+          <a:blip r:embed="rId1"/>
+          <a:stretch>
+            <a:fillRect/>
+          </a:stretch>
+        </p:blipFill>
+        <p:spPr>
+          <a:xfrm>
+            <a:off x="127000" y="6119495"/>
+            <a:ext cx="602615" cy="601980"/>
+          </a:xfrm>
+          <a:prstGeom prst="rect">
+            <a:avLst/>
+          </a:prstGeom>
+        </p:spPr>
+      </p:pic>
+    </p:spTree>
+  </p:cSld>
+  <p:clrMapOvr>
+    <a:masterClrMapping/>
+  </p:clrMapOvr>
+</p:sld>
+</file>
+
+<file path=ppt/slides/slide14.xml><?xml version="1.0" encoding="utf-8"?>
+<p:sld xmlns:a="http://schemas.openxmlformats.org/drawingml/2006/main" xmlns:r="http://schemas.openxmlformats.org/officeDocument/2006/relationships" xmlns:p="http://schemas.openxmlformats.org/presentationml/2006/main">
+  <p:cSld>
+    <p:spTree>
+      <p:nvGrpSpPr>
+        <p:cNvPr id="1" name=""/>
+        <p:cNvGrpSpPr/>
+        <p:nvPr/>
+      </p:nvGrpSpPr>
+      <p:grpSpPr/>
+      <p:sp>
+        <p:nvSpPr>
+          <p:cNvPr id="2" name="Title 1"/>
+          <p:cNvSpPr>
+            <a:spLocks noGrp="1"/>
+          </p:cNvSpPr>
+          <p:nvPr>
+            <p:ph type="title"/>
+          </p:nvPr>
+        </p:nvSpPr>
+        <p:spPr/>
+        <p:txBody>
+          <a:bodyPr>
+            <a:normAutofit/>
+          </a:bodyPr>
+          <a:p>
+            <a:r>
+              <a:rPr lang="en-US" altLang="en-US"/>
+              <a:t>Partikelschwarmoptimierung </a:t>
+            </a:r>
+            <a:r>
+              <a:rPr lang="" altLang="en-US"/>
+              <a:t>(fort.)</a:t>
+            </a:r>
+            <a:endParaRPr lang="" altLang="en-US"/>
+          </a:p>
+        </p:txBody>
+      </p:sp>
+      <p:sp>
+        <p:nvSpPr>
+          <p:cNvPr id="3" name="Content Placeholder 2"/>
+          <p:cNvSpPr>
+            <a:spLocks noGrp="1"/>
+          </p:cNvSpPr>
+          <p:nvPr>
+            <p:ph idx="1"/>
+          </p:nvPr>
+        </p:nvSpPr>
+        <p:spPr/>
+        <p:txBody>
+          <a:bodyPr/>
+          <a:p>
+            <a:pPr lvl="1"/>
+            <a:endParaRPr lang="en-US"/>
+          </a:p>
+        </p:txBody>
+      </p:sp>
+      <p:sp>
+        <p:nvSpPr>
+          <p:cNvPr id="5" name="Slide Number Placeholder 4"/>
+          <p:cNvSpPr>
+            <a:spLocks noGrp="1"/>
+          </p:cNvSpPr>
+          <p:nvPr>
+            <p:ph type="sldNum" sz="quarter" idx="12"/>
+          </p:nvPr>
+        </p:nvSpPr>
+        <p:spPr/>
+        <p:txBody>
+          <a:bodyPr/>
+          <a:p>
+            <a:fld id="{B3561BA9-CDCF-4958-B8AB-66F3BF063E13}" type="slidenum">
+              <a:rPr lang="en-US" smtClean="0"/>
+            </a:fld>
+            <a:endParaRPr lang="en-US"/>
+          </a:p>
+        </p:txBody>
+      </p:sp>
+      <p:pic>
+        <p:nvPicPr>
+          <p:cNvPr id="7" name="Picture 6" descr="uhh_logo_klein"/>
+          <p:cNvPicPr>
+            <a:picLocks noChangeAspect="1"/>
+          </p:cNvPicPr>
+          <p:nvPr/>
+        </p:nvPicPr>
+        <p:blipFill>
+          <a:blip r:embed="rId1"/>
+          <a:stretch>
+            <a:fillRect/>
+          </a:stretch>
+        </p:blipFill>
+        <p:spPr>
+          <a:xfrm>
+            <a:off x="127000" y="6119495"/>
+            <a:ext cx="602615" cy="601980"/>
+          </a:xfrm>
+          <a:prstGeom prst="rect">
+            <a:avLst/>
+          </a:prstGeom>
+        </p:spPr>
+      </p:pic>
+    </p:spTree>
+  </p:cSld>
+  <p:clrMapOvr>
+    <a:masterClrMapping/>
+  </p:clrMapOvr>
+</p:sld>
+</file>
+
+<file path=ppt/slides/slide15.xml><?xml version="1.0" encoding="utf-8"?>
+<p:sld xmlns:a="http://schemas.openxmlformats.org/drawingml/2006/main" xmlns:r="http://schemas.openxmlformats.org/officeDocument/2006/relationships" xmlns:p="http://schemas.openxmlformats.org/presentationml/2006/main">
+  <p:cSld>
+    <p:spTree>
+      <p:nvGrpSpPr>
+        <p:cNvPr id="1" name=""/>
+        <p:cNvGrpSpPr/>
+        <p:nvPr/>
+      </p:nvGrpSpPr>
+      <p:grpSpPr/>
+      <p:sp>
+        <p:nvSpPr>
+          <p:cNvPr id="2" name="Title 1"/>
+          <p:cNvSpPr>
+            <a:spLocks noGrp="1"/>
+          </p:cNvSpPr>
+          <p:nvPr>
+            <p:ph type="title"/>
+          </p:nvPr>
+        </p:nvSpPr>
+        <p:spPr/>
+        <p:txBody>
+          <a:bodyPr>
+            <a:normAutofit/>
+          </a:bodyPr>
+          <a:p>
+            <a:r>
+              <a:rPr lang="" altLang="en-US"/>
+              <a:t>Andere EA</a:t>
+            </a:r>
+            <a:endParaRPr lang="" altLang="en-US"/>
+          </a:p>
+        </p:txBody>
+      </p:sp>
+      <p:sp>
+        <p:nvSpPr>
+          <p:cNvPr id="3" name="Content Placeholder 2"/>
+          <p:cNvSpPr>
+            <a:spLocks noGrp="1"/>
+          </p:cNvSpPr>
+          <p:nvPr>
+            <p:ph idx="1"/>
+          </p:nvPr>
+        </p:nvSpPr>
+        <p:spPr>
+          <a:xfrm>
+            <a:off x="627380" y="1640840"/>
+            <a:ext cx="5421630" cy="4478655"/>
+          </a:xfrm>
+        </p:spPr>
+        <p:txBody>
+          <a:bodyPr>
+            <a:noAutofit/>
+          </a:bodyPr>
+          <a:p>
+            <a:pPr lvl="1"/>
+            <a:r>
+              <a:rPr lang="" altLang="en-US" sz="1800"/>
+              <a:t>Ant colony optimization (ACO)</a:t>
+            </a:r>
+            <a:endParaRPr lang="" altLang="en-US" sz="1800"/>
+          </a:p>
+          <a:p>
+            <a:pPr lvl="2"/>
+            <a:r>
+              <a:rPr lang="" altLang="en-US" sz="1500"/>
+              <a:t>I Dorigo and Stutzle (2004)</a:t>
+            </a:r>
+            <a:endParaRPr lang="" altLang="en-US" sz="1500"/>
+          </a:p>
+          <a:p>
+            <a:pPr lvl="1"/>
+            <a:r>
+              <a:rPr lang="" altLang="en-US" sz="1800"/>
+              <a:t>Artificial immune system optimization</a:t>
+            </a:r>
+            <a:endParaRPr lang="" altLang="en-US" sz="1800"/>
+          </a:p>
+          <a:p>
+            <a:pPr lvl="2"/>
+            <a:r>
+              <a:rPr lang="" altLang="en-US" sz="1500"/>
+              <a:t>Cutello and Nicosia (2002)</a:t>
+            </a:r>
+            <a:endParaRPr lang="" altLang="en-US" sz="1500"/>
+          </a:p>
+          <a:p>
+            <a:pPr lvl="1"/>
+            <a:r>
+              <a:rPr lang="" altLang="en-US" sz="1800"/>
+              <a:t>Bacterial foraging optimization</a:t>
+            </a:r>
+            <a:endParaRPr lang="" altLang="en-US" sz="1800"/>
+          </a:p>
+          <a:p>
+            <a:pPr lvl="2"/>
+            <a:r>
+              <a:rPr lang="" altLang="en-US" sz="1500"/>
+              <a:t>Kim, Abraham and Cho (2007)</a:t>
+            </a:r>
+            <a:endParaRPr lang="" altLang="en-US" sz="1500"/>
+          </a:p>
+          <a:p>
+            <a:pPr lvl="1"/>
+            <a:r>
+              <a:rPr lang="" altLang="en-US" sz="1800"/>
+              <a:t>Artificial bee colony optimization (ABC)</a:t>
+            </a:r>
+            <a:endParaRPr lang="" altLang="en-US" sz="1800"/>
+          </a:p>
+          <a:p>
+            <a:pPr lvl="2"/>
+            <a:r>
+              <a:rPr lang="" altLang="en-US" sz="1500"/>
+              <a:t>Karaboga, (2005)</a:t>
+            </a:r>
+            <a:endParaRPr lang="" altLang="en-US" sz="1500"/>
+          </a:p>
+          <a:p>
+            <a:pPr lvl="1"/>
+            <a:r>
+              <a:rPr lang="" altLang="en-US" sz="1800"/>
+              <a:t>Cuckoo algorithm</a:t>
+            </a:r>
+            <a:endParaRPr lang="" altLang="en-US" sz="1800"/>
+          </a:p>
+          <a:p>
+            <a:pPr lvl="2"/>
+            <a:r>
+              <a:rPr lang="" altLang="en-US" sz="1500"/>
+              <a:t>Yang and Deb (2009, 2010)</a:t>
+            </a:r>
+            <a:endParaRPr lang="" altLang="en-US" sz="1500"/>
+          </a:p>
+          <a:p>
+            <a:pPr lvl="1"/>
+            <a:r>
+              <a:rPr lang="" altLang="en-US" sz="1800"/>
+              <a:t>Firefly optimization</a:t>
+            </a:r>
+            <a:endParaRPr lang="" altLang="en-US" sz="1800"/>
+          </a:p>
+          <a:p>
+            <a:pPr lvl="2"/>
+            <a:r>
+              <a:rPr lang="" altLang="en-US" sz="1500"/>
+              <a:t>Yang (2010)</a:t>
+            </a:r>
+            <a:endParaRPr lang="" altLang="en-US" sz="1500"/>
+          </a:p>
+          <a:p>
+            <a:pPr lvl="1"/>
+            <a:r>
+              <a:rPr lang="" altLang="en-US" sz="1800"/>
+              <a:t>Fish optimization</a:t>
+            </a:r>
+            <a:endParaRPr lang="" altLang="en-US" sz="1800"/>
+          </a:p>
+          <a:p>
+            <a:pPr lvl="2"/>
+            <a:r>
+              <a:rPr lang="" altLang="en-US" sz="1500"/>
+              <a:t>Huang and Zhou (2008)</a:t>
+            </a:r>
+            <a:endParaRPr lang="" altLang="en-US" sz="1500"/>
+          </a:p>
+          <a:p>
+            <a:pPr lvl="1"/>
+            <a:r>
+              <a:rPr lang="" altLang="en-US" sz="1800"/>
+              <a:t>Raindrop optimization</a:t>
+            </a:r>
+            <a:endParaRPr lang="" altLang="en-US" sz="1800"/>
+          </a:p>
+          <a:p>
+            <a:pPr lvl="2"/>
+            <a:r>
+              <a:rPr lang="" altLang="en-US" sz="1500"/>
+              <a:t>Shah-Hosseini (2009)</a:t>
+            </a:r>
+            <a:endParaRPr lang="" altLang="en-US" sz="1500"/>
+          </a:p>
+        </p:txBody>
+      </p:sp>
+      <p:sp>
+        <p:nvSpPr>
+          <p:cNvPr id="5" name="Slide Number Placeholder 4"/>
+          <p:cNvSpPr>
+            <a:spLocks noGrp="1"/>
+          </p:cNvSpPr>
+          <p:nvPr>
+            <p:ph type="sldNum" sz="quarter" idx="12"/>
+          </p:nvPr>
+        </p:nvSpPr>
+        <p:spPr/>
+        <p:txBody>
+          <a:bodyPr/>
+          <a:p>
+            <a:fld id="{B3561BA9-CDCF-4958-B8AB-66F3BF063E13}" type="slidenum">
+              <a:rPr lang="en-US" smtClean="0"/>
+            </a:fld>
+            <a:endParaRPr lang="en-US"/>
+          </a:p>
+        </p:txBody>
+      </p:sp>
+      <p:pic>
+        <p:nvPicPr>
+          <p:cNvPr id="7" name="Picture 6" descr="uhh_logo_klein"/>
+          <p:cNvPicPr>
+            <a:picLocks noChangeAspect="1"/>
+          </p:cNvPicPr>
+          <p:nvPr/>
+        </p:nvPicPr>
+        <p:blipFill>
+          <a:blip r:embed="rId1"/>
+          <a:stretch>
+            <a:fillRect/>
+          </a:stretch>
+        </p:blipFill>
+        <p:spPr>
+          <a:xfrm>
+            <a:off x="127000" y="6119495"/>
+            <a:ext cx="602615" cy="601980"/>
+          </a:xfrm>
+          <a:prstGeom prst="rect">
+            <a:avLst/>
+          </a:prstGeom>
+        </p:spPr>
+      </p:pic>
+      <p:sp>
+        <p:nvSpPr>
+          <p:cNvPr id="9" name="Content Placeholder 2"/>
+          <p:cNvSpPr>
+            <a:spLocks noGrp="1"/>
+          </p:cNvSpPr>
+          <p:nvPr/>
+        </p:nvSpPr>
+        <p:spPr>
+          <a:xfrm>
+            <a:off x="5728335" y="1325880"/>
+            <a:ext cx="5869305" cy="4478655"/>
+          </a:xfrm>
+          <a:prstGeom prst="rect">
+            <a:avLst/>
+          </a:prstGeom>
+        </p:spPr>
+        <p:txBody>
+          <a:bodyPr vert="horz" lIns="91440" tIns="45720" rIns="91440" bIns="45720" rtlCol="0">
+            <a:noAutofit/>
+          </a:bodyPr>
+          <a:lstStyle>
+            <a:lvl1pPr marL="228600" indent="-228600" algn="l" defTabSz="914400" rtl="0" eaLnBrk="1" latinLnBrk="0" hangingPunct="1">
+              <a:lnSpc>
+                <a:spcPct val="90000"/>
+              </a:lnSpc>
+              <a:spcBef>
+                <a:spcPts val="1000"/>
+              </a:spcBef>
+              <a:buFont typeface="Arial" panose="02080604020202020204" pitchFamily="34" charset="0"/>
+              <a:buChar char="•"/>
+              <a:defRPr sz="2800" kern="1200">
+                <a:solidFill>
+                  <a:schemeClr val="tx1"/>
+                </a:solidFill>
+                <a:latin typeface="+mn-lt"/>
+                <a:ea typeface="+mn-ea"/>
+                <a:cs typeface="+mn-cs"/>
+              </a:defRPr>
+            </a:lvl1pPr>
+            <a:lvl2pPr marL="685800" indent="-228600" algn="l" defTabSz="914400" rtl="0" eaLnBrk="1" latinLnBrk="0" hangingPunct="1">
+              <a:lnSpc>
+                <a:spcPct val="90000"/>
+              </a:lnSpc>
+              <a:spcBef>
+                <a:spcPts val="500"/>
+              </a:spcBef>
+              <a:buFont typeface="Arial" panose="02080604020202020204" pitchFamily="34" charset="0"/>
+              <a:buChar char="•"/>
+              <a:defRPr sz="2400" kern="1200">
+                <a:solidFill>
+                  <a:schemeClr val="tx1"/>
+                </a:solidFill>
+                <a:latin typeface="+mn-lt"/>
+                <a:ea typeface="+mn-ea"/>
+                <a:cs typeface="+mn-cs"/>
+              </a:defRPr>
+            </a:lvl2pPr>
+            <a:lvl3pPr marL="1143000" indent="-228600" algn="l" defTabSz="914400" rtl="0" eaLnBrk="1" latinLnBrk="0" hangingPunct="1">
+              <a:lnSpc>
+                <a:spcPct val="90000"/>
+              </a:lnSpc>
+              <a:spcBef>
+                <a:spcPts val="500"/>
+              </a:spcBef>
+              <a:buFont typeface="Arial" panose="02080604020202020204" pitchFamily="34" charset="0"/>
+              <a:buChar char="•"/>
+              <a:defRPr sz="2000" kern="1200">
+                <a:solidFill>
+                  <a:schemeClr val="tx1"/>
+                </a:solidFill>
+                <a:latin typeface="+mn-lt"/>
+                <a:ea typeface="+mn-ea"/>
+                <a:cs typeface="+mn-cs"/>
+              </a:defRPr>
+            </a:lvl3pPr>
+            <a:lvl4pPr marL="1600200" indent="-228600" algn="l" defTabSz="914400" rtl="0" eaLnBrk="1" latinLnBrk="0" hangingPunct="1">
+              <a:lnSpc>
+                <a:spcPct val="90000"/>
+              </a:lnSpc>
+              <a:spcBef>
+                <a:spcPts val="500"/>
+              </a:spcBef>
+              <a:buFont typeface="Arial" panose="02080604020202020204" pitchFamily="34" charset="0"/>
+              <a:buChar char="•"/>
+              <a:defRPr sz="1800" kern="1200">
+                <a:solidFill>
+                  <a:schemeClr val="tx1"/>
+                </a:solidFill>
+                <a:latin typeface="+mn-lt"/>
+                <a:ea typeface="+mn-ea"/>
+                <a:cs typeface="+mn-cs"/>
+              </a:defRPr>
+            </a:lvl4pPr>
+            <a:lvl5pPr marL="2057400" indent="-228600" algn="l" defTabSz="914400" rtl="0" eaLnBrk="1" latinLnBrk="0" hangingPunct="1">
+              <a:lnSpc>
+                <a:spcPct val="90000"/>
+              </a:lnSpc>
+              <a:spcBef>
+                <a:spcPts val="500"/>
+              </a:spcBef>
+              <a:buFont typeface="Arial" panose="02080604020202020204" pitchFamily="34" charset="0"/>
+              <a:buChar char="•"/>
+              <a:defRPr sz="1800" kern="1200">
+                <a:solidFill>
+                  <a:schemeClr val="tx1"/>
+                </a:solidFill>
+                <a:latin typeface="+mn-lt"/>
+                <a:ea typeface="+mn-ea"/>
+                <a:cs typeface="+mn-cs"/>
+              </a:defRPr>
+            </a:lvl5pPr>
+            <a:lvl6pPr marL="2514600" indent="-228600" algn="l" defTabSz="914400" rtl="0" eaLnBrk="1" latinLnBrk="0" hangingPunct="1">
+              <a:lnSpc>
+                <a:spcPct val="90000"/>
+              </a:lnSpc>
+              <a:spcBef>
+                <a:spcPts val="500"/>
+              </a:spcBef>
+              <a:buFont typeface="Arial" panose="02080604020202020204" pitchFamily="34" charset="0"/>
+              <a:buChar char="•"/>
+              <a:defRPr sz="1800" kern="1200">
+                <a:solidFill>
+                  <a:schemeClr val="tx1"/>
+                </a:solidFill>
+                <a:latin typeface="+mn-lt"/>
+                <a:ea typeface="+mn-ea"/>
+                <a:cs typeface="+mn-cs"/>
+              </a:defRPr>
+            </a:lvl6pPr>
+            <a:lvl7pPr marL="2971800" indent="-228600" algn="l" defTabSz="914400" rtl="0" eaLnBrk="1" latinLnBrk="0" hangingPunct="1">
+              <a:lnSpc>
+                <a:spcPct val="90000"/>
+              </a:lnSpc>
+              <a:spcBef>
+                <a:spcPts val="500"/>
+              </a:spcBef>
+              <a:buFont typeface="Arial" panose="02080604020202020204" pitchFamily="34" charset="0"/>
+              <a:buChar char="•"/>
+              <a:defRPr sz="1800" kern="1200">
+                <a:solidFill>
+                  <a:schemeClr val="tx1"/>
+                </a:solidFill>
+                <a:latin typeface="+mn-lt"/>
+                <a:ea typeface="+mn-ea"/>
+                <a:cs typeface="+mn-cs"/>
+              </a:defRPr>
+            </a:lvl7pPr>
+            <a:lvl8pPr marL="3429000" indent="-228600" algn="l" defTabSz="914400" rtl="0" eaLnBrk="1" latinLnBrk="0" hangingPunct="1">
+              <a:lnSpc>
+                <a:spcPct val="90000"/>
+              </a:lnSpc>
+              <a:spcBef>
+                <a:spcPts val="500"/>
+              </a:spcBef>
+              <a:buFont typeface="Arial" panose="02080604020202020204" pitchFamily="34" charset="0"/>
+              <a:buChar char="•"/>
+              <a:defRPr sz="1800" kern="1200">
+                <a:solidFill>
+                  <a:schemeClr val="tx1"/>
+                </a:solidFill>
+                <a:latin typeface="+mn-lt"/>
+                <a:ea typeface="+mn-ea"/>
+                <a:cs typeface="+mn-cs"/>
+              </a:defRPr>
+            </a:lvl8pPr>
+            <a:lvl9pPr marL="3886200" indent="-228600" algn="l" defTabSz="914400" rtl="0" eaLnBrk="1" latinLnBrk="0" hangingPunct="1">
+              <a:lnSpc>
+                <a:spcPct val="90000"/>
+              </a:lnSpc>
+              <a:spcBef>
+                <a:spcPts val="500"/>
+              </a:spcBef>
+              <a:buFont typeface="Arial" panose="02080604020202020204" pitchFamily="34" charset="0"/>
+              <a:buChar char="•"/>
+              <a:defRPr sz="1800" kern="1200">
+                <a:solidFill>
+                  <a:schemeClr val="tx1"/>
+                </a:solidFill>
+                <a:latin typeface="+mn-lt"/>
+                <a:ea typeface="+mn-ea"/>
+                <a:cs typeface="+mn-cs"/>
+              </a:defRPr>
+            </a:lvl9pPr>
+          </a:lstStyle>
+          <a:p>
+            <a:pPr lvl="1"/>
+            <a:r>
+              <a:rPr lang="en-US" altLang="en-US" sz="1800"/>
+              <a:t>Simulated annealing</a:t>
+            </a:r>
+            <a:endParaRPr lang="en-US" altLang="en-US" sz="1800"/>
+          </a:p>
+          <a:p>
+            <a:pPr lvl="2"/>
+            <a:r>
+              <a:rPr lang="en-US" altLang="en-US" sz="1500"/>
+              <a:t>Kirkpatrick, Gelatt and Vecchi (1983)</a:t>
+            </a:r>
+            <a:endParaRPr lang="en-US" altLang="en-US" sz="1500"/>
+          </a:p>
+          <a:p>
+            <a:pPr lvl="1"/>
+            <a:r>
+              <a:rPr lang="en-US" altLang="en-US" sz="1800"/>
+              <a:t>Biogeography-based optimization (BBO)</a:t>
+            </a:r>
+            <a:endParaRPr lang="en-US" altLang="en-US" sz="1800"/>
+          </a:p>
+          <a:p>
+            <a:pPr lvl="1"/>
+            <a:r>
+              <a:rPr lang="en-US" altLang="en-US" sz="1800"/>
+              <a:t>Chemical reaction optimization (CRO)</a:t>
+            </a:r>
+            <a:endParaRPr lang="en-US" altLang="en-US" sz="1800"/>
+          </a:p>
+          <a:p>
+            <a:pPr lvl="1"/>
+            <a:r>
+              <a:rPr lang="en-US" altLang="en-US" sz="1800"/>
+              <a:t>Group search optimizer (GSO)</a:t>
+            </a:r>
+            <a:endParaRPr lang="en-US" altLang="en-US" sz="1800"/>
+          </a:p>
+          <a:p>
+            <a:pPr lvl="1"/>
+            <a:r>
+              <a:rPr lang="en-US" altLang="en-US" sz="1800"/>
+              <a:t>Imperialist competitive algorithm (ICA)</a:t>
+            </a:r>
+            <a:endParaRPr lang="en-US" altLang="en-US" sz="1800"/>
+          </a:p>
+          <a:p>
+            <a:pPr lvl="1"/>
+            <a:r>
+              <a:rPr lang="en-US" altLang="en-US" sz="1800"/>
+              <a:t>Swine flow Optimization Algorithm</a:t>
+            </a:r>
+            <a:endParaRPr lang="en-US" altLang="en-US" sz="1800"/>
+          </a:p>
+          <a:p>
+            <a:pPr lvl="1"/>
+            <a:r>
+              <a:rPr lang="en-US" altLang="en-US" sz="1800"/>
+              <a:t>Teaching Learning Based Optimization (TLBO)</a:t>
+            </a:r>
+            <a:endParaRPr lang="en-US" altLang="en-US" sz="1800"/>
+          </a:p>
+          <a:p>
+            <a:pPr lvl="1"/>
+            <a:r>
+              <a:rPr lang="en-US" altLang="en-US" sz="1800"/>
+              <a:t>Bayesian Optimization Algorithms (BOA)</a:t>
+            </a:r>
+            <a:endParaRPr lang="en-US" altLang="en-US" sz="1800"/>
+          </a:p>
+          <a:p>
+            <a:pPr lvl="1"/>
+            <a:r>
+              <a:rPr lang="en-US" altLang="en-US" sz="1800"/>
+              <a:t>Population-based incremental learning (PBIL)</a:t>
+            </a:r>
+            <a:endParaRPr lang="en-US" altLang="en-US" sz="1800"/>
+          </a:p>
+          <a:p>
+            <a:pPr lvl="1"/>
+            <a:r>
+              <a:rPr lang="en-US" altLang="en-US" sz="1800"/>
+              <a:t>Evolution strategy with covariance matrix adaptation (CMA-ES)</a:t>
+            </a:r>
+            <a:endParaRPr lang="en-US" altLang="en-US" sz="1800"/>
+          </a:p>
+        </p:txBody>
+      </p:sp>
+    </p:spTree>
+  </p:cSld>
+  <p:clrMapOvr>
+    <a:masterClrMapping/>
+  </p:clrMapOvr>
+</p:sld>
+</file>
+
+<file path=ppt/slides/slide16.xml><?xml version="1.0" encoding="utf-8"?>
+<p:sld xmlns:a="http://schemas.openxmlformats.org/drawingml/2006/main" xmlns:r="http://schemas.openxmlformats.org/officeDocument/2006/relationships" xmlns:p="http://schemas.openxmlformats.org/presentationml/2006/main">
+  <p:cSld>
+    <p:spTree>
+      <p:nvGrpSpPr>
+        <p:cNvPr id="1" name=""/>
+        <p:cNvGrpSpPr/>
+        <p:nvPr/>
+      </p:nvGrpSpPr>
+      <p:grpSpPr/>
+      <p:sp>
+        <p:nvSpPr>
+          <p:cNvPr id="2" name="Title 1"/>
+          <p:cNvSpPr>
+            <a:spLocks noGrp="1"/>
+          </p:cNvSpPr>
+          <p:nvPr>
+            <p:ph type="title"/>
+          </p:nvPr>
+        </p:nvSpPr>
+        <p:spPr/>
+        <p:txBody>
+          <a:bodyPr>
+            <a:normAutofit/>
+          </a:bodyPr>
+          <a:p>
+            <a:r>
+              <a:rPr lang="" altLang="en-US"/>
+              <a:t>Noch mehr EA</a:t>
+            </a:r>
+            <a:endParaRPr lang="" altLang="en-US"/>
+          </a:p>
+        </p:txBody>
+      </p:sp>
+      <p:sp>
+        <p:nvSpPr>
+          <p:cNvPr id="5" name="Slide Number Placeholder 4"/>
+          <p:cNvSpPr>
+            <a:spLocks noGrp="1"/>
+          </p:cNvSpPr>
+          <p:nvPr>
+            <p:ph type="sldNum" sz="quarter" idx="12"/>
+          </p:nvPr>
+        </p:nvSpPr>
+        <p:spPr/>
+        <p:txBody>
+          <a:bodyPr/>
+          <a:p>
+            <a:fld id="{B3561BA9-CDCF-4958-B8AB-66F3BF063E13}" type="slidenum">
+              <a:rPr lang="en-US" smtClean="0"/>
+            </a:fld>
+            <a:endParaRPr lang="en-US"/>
+          </a:p>
+        </p:txBody>
+      </p:sp>
+      <p:pic>
+        <p:nvPicPr>
+          <p:cNvPr id="7" name="Picture 6" descr="uhh_logo_klein"/>
+          <p:cNvPicPr>
+            <a:picLocks noChangeAspect="1"/>
+          </p:cNvPicPr>
+          <p:nvPr/>
+        </p:nvPicPr>
+        <p:blipFill>
+          <a:blip r:embed="rId1"/>
+          <a:stretch>
+            <a:fillRect/>
+          </a:stretch>
+        </p:blipFill>
+        <p:spPr>
+          <a:xfrm>
+            <a:off x="127000" y="6119495"/>
+            <a:ext cx="602615" cy="601980"/>
+          </a:xfrm>
+          <a:prstGeom prst="rect">
+            <a:avLst/>
+          </a:prstGeom>
+        </p:spPr>
+      </p:pic>
+      <p:sp>
+        <p:nvSpPr>
+          <p:cNvPr id="4" name="Content Placeholder 3"/>
+          <p:cNvSpPr>
+            <a:spLocks noGrp="1"/>
+          </p:cNvSpPr>
+          <p:nvPr>
+            <p:ph idx="1"/>
+          </p:nvPr>
+        </p:nvSpPr>
+        <p:spPr>
+          <a:xfrm>
+            <a:off x="468630" y="1729105"/>
+            <a:ext cx="5601970" cy="4478655"/>
+          </a:xfrm>
+        </p:spPr>
+        <p:txBody>
+          <a:bodyPr>
+            <a:noAutofit/>
+          </a:bodyPr>
+          <a:p>
+            <a:pPr lvl="1"/>
+            <a:r>
+              <a:rPr lang="en-US" altLang="en-US" sz="1800"/>
+              <a:t>Charged system search pptimization algorithm </a:t>
+            </a:r>
+            <a:endParaRPr lang="en-US" altLang="en-US" sz="1800"/>
+          </a:p>
+          <a:p>
+            <a:pPr lvl="1"/>
+            <a:r>
+              <a:rPr lang="en-US" altLang="en-US" sz="1800"/>
+              <a:t>Continuous scatter search (CSS) Optimization Algorithm</a:t>
+            </a:r>
+            <a:endParaRPr lang="en-US" altLang="en-US" sz="1800"/>
+          </a:p>
+          <a:p>
+            <a:pPr lvl="1"/>
+            <a:r>
+              <a:rPr lang="en-US" altLang="en-US" sz="1800"/>
+              <a:t>Evolutionary programming</a:t>
+            </a:r>
+            <a:endParaRPr lang="en-US" altLang="en-US" sz="1800"/>
+          </a:p>
+          <a:p>
+            <a:pPr lvl="1"/>
+            <a:r>
+              <a:rPr lang="en-US" altLang="en-US" sz="1800"/>
+              <a:t>League championship algorithm</a:t>
+            </a:r>
+            <a:endParaRPr lang="en-US" altLang="en-US" sz="1800"/>
+          </a:p>
+          <a:p>
+            <a:pPr lvl="1"/>
+            <a:r>
+              <a:rPr lang="en-US" altLang="en-US" sz="1800"/>
+              <a:t>Harmony search Optimization algorithm</a:t>
+            </a:r>
+            <a:endParaRPr lang="en-US" altLang="en-US" sz="1800"/>
+          </a:p>
+          <a:p>
+            <a:pPr lvl="1"/>
+            <a:r>
+              <a:rPr lang="en-US" altLang="en-US" sz="1800"/>
+              <a:t>Gravitational search algorithm </a:t>
+            </a:r>
+            <a:r>
+              <a:rPr lang="" altLang="en-US" sz="1800"/>
+              <a:t>(GSA) </a:t>
+            </a:r>
+            <a:r>
+              <a:rPr lang="en-US" altLang="en-US" sz="1800"/>
+              <a:t>Optimization</a:t>
+            </a:r>
+            <a:endParaRPr lang="en-US" altLang="en-US" sz="1800"/>
+          </a:p>
+          <a:p>
+            <a:pPr lvl="1"/>
+            <a:r>
+              <a:rPr lang="en-US" altLang="en-US" sz="1800"/>
+              <a:t>Evolution strategies Optimization</a:t>
+            </a:r>
+            <a:endParaRPr lang="en-US" altLang="en-US" sz="1800"/>
+          </a:p>
+          <a:p>
+            <a:pPr lvl="1"/>
+            <a:r>
+              <a:rPr lang="en-US" altLang="en-US" sz="1800"/>
+              <a:t>Firework algorithm</a:t>
+            </a:r>
+            <a:endParaRPr lang="en-US" altLang="en-US" sz="1800"/>
+          </a:p>
+          <a:p>
+            <a:pPr lvl="2"/>
+            <a:r>
+              <a:rPr lang="en-US" altLang="en-US" sz="1500"/>
+              <a:t>Ying Tan, (2010)</a:t>
+            </a:r>
+            <a:endParaRPr lang="en-US" altLang="en-US" sz="1500"/>
+          </a:p>
+          <a:p>
+            <a:pPr lvl="1"/>
+            <a:r>
+              <a:rPr lang="en-US" altLang="en-US" sz="1800"/>
+              <a:t>Big-bang big-crunch Optimization algorithm</a:t>
+            </a:r>
+            <a:endParaRPr lang="en-US" altLang="en-US" sz="1800"/>
+          </a:p>
+          <a:p>
+            <a:pPr lvl="2"/>
+            <a:r>
+              <a:rPr lang="en-US" altLang="en-US" sz="1500"/>
+              <a:t>OK Erol, (2006)</a:t>
+            </a:r>
+            <a:endParaRPr lang="en-US" altLang="en-US" sz="1500"/>
+          </a:p>
+        </p:txBody>
+      </p:sp>
+      <p:sp>
+        <p:nvSpPr>
+          <p:cNvPr id="9" name="Content Placeholder 2"/>
+          <p:cNvSpPr>
+            <a:spLocks noGrp="1"/>
+          </p:cNvSpPr>
+          <p:nvPr/>
+        </p:nvSpPr>
+        <p:spPr>
+          <a:xfrm>
+            <a:off x="5728335" y="1325880"/>
+            <a:ext cx="5869305" cy="4478655"/>
+          </a:xfrm>
+          <a:prstGeom prst="rect">
+            <a:avLst/>
+          </a:prstGeom>
+        </p:spPr>
+        <p:txBody>
+          <a:bodyPr vert="horz" lIns="91440" tIns="45720" rIns="91440" bIns="45720" rtlCol="0">
+            <a:noAutofit/>
+          </a:bodyPr>
+          <a:lstStyle>
+            <a:lvl1pPr marL="228600" indent="-228600" algn="l" defTabSz="914400" rtl="0" eaLnBrk="1" latinLnBrk="0" hangingPunct="1">
+              <a:lnSpc>
+                <a:spcPct val="90000"/>
+              </a:lnSpc>
+              <a:spcBef>
+                <a:spcPts val="1000"/>
+              </a:spcBef>
+              <a:buFont typeface="Arial" panose="02080604020202020204" pitchFamily="34" charset="0"/>
+              <a:buChar char="•"/>
+              <a:defRPr sz="2800" kern="1200">
+                <a:solidFill>
+                  <a:schemeClr val="tx1"/>
+                </a:solidFill>
+                <a:latin typeface="+mn-lt"/>
+                <a:ea typeface="+mn-ea"/>
+                <a:cs typeface="+mn-cs"/>
+              </a:defRPr>
+            </a:lvl1pPr>
+            <a:lvl2pPr marL="685800" indent="-228600" algn="l" defTabSz="914400" rtl="0" eaLnBrk="1" latinLnBrk="0" hangingPunct="1">
+              <a:lnSpc>
+                <a:spcPct val="90000"/>
+              </a:lnSpc>
+              <a:spcBef>
+                <a:spcPts val="500"/>
+              </a:spcBef>
+              <a:buFont typeface="Arial" panose="02080604020202020204" pitchFamily="34" charset="0"/>
+              <a:buChar char="•"/>
+              <a:defRPr sz="2400" kern="1200">
+                <a:solidFill>
+                  <a:schemeClr val="tx1"/>
+                </a:solidFill>
+                <a:latin typeface="+mn-lt"/>
+                <a:ea typeface="+mn-ea"/>
+                <a:cs typeface="+mn-cs"/>
+              </a:defRPr>
+            </a:lvl2pPr>
+            <a:lvl3pPr marL="1143000" indent="-228600" algn="l" defTabSz="914400" rtl="0" eaLnBrk="1" latinLnBrk="0" hangingPunct="1">
+              <a:lnSpc>
+                <a:spcPct val="90000"/>
+              </a:lnSpc>
+              <a:spcBef>
+                <a:spcPts val="500"/>
+              </a:spcBef>
+              <a:buFont typeface="Arial" panose="02080604020202020204" pitchFamily="34" charset="0"/>
+              <a:buChar char="•"/>
+              <a:defRPr sz="2000" kern="1200">
+                <a:solidFill>
+                  <a:schemeClr val="tx1"/>
+                </a:solidFill>
+                <a:latin typeface="+mn-lt"/>
+                <a:ea typeface="+mn-ea"/>
+                <a:cs typeface="+mn-cs"/>
+              </a:defRPr>
+            </a:lvl3pPr>
+            <a:lvl4pPr marL="1600200" indent="-228600" algn="l" defTabSz="914400" rtl="0" eaLnBrk="1" latinLnBrk="0" hangingPunct="1">
+              <a:lnSpc>
+                <a:spcPct val="90000"/>
+              </a:lnSpc>
+              <a:spcBef>
+                <a:spcPts val="500"/>
+              </a:spcBef>
+              <a:buFont typeface="Arial" panose="02080604020202020204" pitchFamily="34" charset="0"/>
+              <a:buChar char="•"/>
+              <a:defRPr sz="1800" kern="1200">
+                <a:solidFill>
+                  <a:schemeClr val="tx1"/>
+                </a:solidFill>
+                <a:latin typeface="+mn-lt"/>
+                <a:ea typeface="+mn-ea"/>
+                <a:cs typeface="+mn-cs"/>
+              </a:defRPr>
+            </a:lvl4pPr>
+            <a:lvl5pPr marL="2057400" indent="-228600" algn="l" defTabSz="914400" rtl="0" eaLnBrk="1" latinLnBrk="0" hangingPunct="1">
+              <a:lnSpc>
+                <a:spcPct val="90000"/>
+              </a:lnSpc>
+              <a:spcBef>
+                <a:spcPts val="500"/>
+              </a:spcBef>
+              <a:buFont typeface="Arial" panose="02080604020202020204" pitchFamily="34" charset="0"/>
+              <a:buChar char="•"/>
+              <a:defRPr sz="1800" kern="1200">
+                <a:solidFill>
+                  <a:schemeClr val="tx1"/>
+                </a:solidFill>
+                <a:latin typeface="+mn-lt"/>
+                <a:ea typeface="+mn-ea"/>
+                <a:cs typeface="+mn-cs"/>
+              </a:defRPr>
+            </a:lvl5pPr>
+            <a:lvl6pPr marL="2514600" indent="-228600" algn="l" defTabSz="914400" rtl="0" eaLnBrk="1" latinLnBrk="0" hangingPunct="1">
+              <a:lnSpc>
+                <a:spcPct val="90000"/>
+              </a:lnSpc>
+              <a:spcBef>
+                <a:spcPts val="500"/>
+              </a:spcBef>
+              <a:buFont typeface="Arial" panose="02080604020202020204" pitchFamily="34" charset="0"/>
+              <a:buChar char="•"/>
+              <a:defRPr sz="1800" kern="1200">
+                <a:solidFill>
+                  <a:schemeClr val="tx1"/>
+                </a:solidFill>
+                <a:latin typeface="+mn-lt"/>
+                <a:ea typeface="+mn-ea"/>
+                <a:cs typeface="+mn-cs"/>
+              </a:defRPr>
+            </a:lvl6pPr>
+            <a:lvl7pPr marL="2971800" indent="-228600" algn="l" defTabSz="914400" rtl="0" eaLnBrk="1" latinLnBrk="0" hangingPunct="1">
+              <a:lnSpc>
+                <a:spcPct val="90000"/>
+              </a:lnSpc>
+              <a:spcBef>
+                <a:spcPts val="500"/>
+              </a:spcBef>
+              <a:buFont typeface="Arial" panose="02080604020202020204" pitchFamily="34" charset="0"/>
+              <a:buChar char="•"/>
+              <a:defRPr sz="1800" kern="1200">
+                <a:solidFill>
+                  <a:schemeClr val="tx1"/>
+                </a:solidFill>
+                <a:latin typeface="+mn-lt"/>
+                <a:ea typeface="+mn-ea"/>
+                <a:cs typeface="+mn-cs"/>
+              </a:defRPr>
+            </a:lvl7pPr>
+            <a:lvl8pPr marL="3429000" indent="-228600" algn="l" defTabSz="914400" rtl="0" eaLnBrk="1" latinLnBrk="0" hangingPunct="1">
+              <a:lnSpc>
+                <a:spcPct val="90000"/>
+              </a:lnSpc>
+              <a:spcBef>
+                <a:spcPts val="500"/>
+              </a:spcBef>
+              <a:buFont typeface="Arial" panose="02080604020202020204" pitchFamily="34" charset="0"/>
+              <a:buChar char="•"/>
+              <a:defRPr sz="1800" kern="1200">
+                <a:solidFill>
+                  <a:schemeClr val="tx1"/>
+                </a:solidFill>
+                <a:latin typeface="+mn-lt"/>
+                <a:ea typeface="+mn-ea"/>
+                <a:cs typeface="+mn-cs"/>
+              </a:defRPr>
+            </a:lvl8pPr>
+            <a:lvl9pPr marL="3886200" indent="-228600" algn="l" defTabSz="914400" rtl="0" eaLnBrk="1" latinLnBrk="0" hangingPunct="1">
+              <a:lnSpc>
+                <a:spcPct val="90000"/>
+              </a:lnSpc>
+              <a:spcBef>
+                <a:spcPts val="500"/>
+              </a:spcBef>
+              <a:buFont typeface="Arial" panose="02080604020202020204" pitchFamily="34" charset="0"/>
+              <a:buChar char="•"/>
+              <a:defRPr sz="1800" kern="1200">
+                <a:solidFill>
+                  <a:schemeClr val="tx1"/>
+                </a:solidFill>
+                <a:latin typeface="+mn-lt"/>
+                <a:ea typeface="+mn-ea"/>
+                <a:cs typeface="+mn-cs"/>
+              </a:defRPr>
+            </a:lvl9pPr>
+          </a:lstStyle>
+          <a:p>
+            <a:pPr lvl="1"/>
+            <a:r>
+              <a:rPr lang="en-US" altLang="en-US" sz="1800"/>
+              <a:t>Backtracking Search Optimization algorithm (BSA)</a:t>
+            </a:r>
+            <a:endParaRPr lang="en-US" altLang="en-US" sz="1800"/>
+          </a:p>
+          <a:p>
+            <a:pPr lvl="1"/>
+            <a:r>
+              <a:rPr lang="en-US" altLang="en-US" sz="1800"/>
+              <a:t>Multi-objective bat algorithm (MOBA)</a:t>
+            </a:r>
+            <a:endParaRPr lang="en-US" altLang="en-US" sz="1800"/>
+          </a:p>
+          <a:p>
+            <a:pPr lvl="1"/>
+            <a:r>
+              <a:rPr lang="en-US" altLang="en-US" sz="1800"/>
+              <a:t>Binary Bat Algorithm (BBA)</a:t>
+            </a:r>
+            <a:endParaRPr lang="en-US" altLang="en-US" sz="1800"/>
+          </a:p>
+          <a:p>
+            <a:pPr lvl="1"/>
+            <a:r>
+              <a:rPr lang="en-US" altLang="en-US" sz="1800"/>
+              <a:t>The Wind Driven Optimization (WDO) algorithm</a:t>
+            </a:r>
+            <a:endParaRPr lang="en-US" altLang="en-US" sz="1800"/>
+          </a:p>
+          <a:p>
+            <a:pPr lvl="1"/>
+            <a:r>
+              <a:rPr lang="en-US" altLang="en-US" sz="1800"/>
+              <a:t>Grey Wolf Optimizer (GWO)</a:t>
+            </a:r>
+            <a:endParaRPr lang="en-US" altLang="en-US" sz="1800"/>
+          </a:p>
+          <a:p>
+            <a:pPr lvl="1"/>
+            <a:r>
+              <a:rPr lang="en-US" altLang="en-US" sz="1800"/>
+              <a:t>Active-Set Algorithm (ASA)</a:t>
+            </a:r>
+            <a:endParaRPr lang="en-US" altLang="en-US" sz="1800"/>
+          </a:p>
+          <a:p>
+            <a:pPr lvl="1"/>
+            <a:r>
+              <a:rPr lang="en-US" altLang="en-US" sz="1800"/>
+              <a:t>Alternating Conditional Expectation algorithm (ACE)</a:t>
+            </a:r>
+            <a:endParaRPr lang="en-US" altLang="en-US" sz="1800"/>
+          </a:p>
+          <a:p>
+            <a:pPr lvl="1"/>
+            <a:r>
+              <a:rPr lang="en-US" altLang="en-US" sz="1800"/>
+              <a:t>Normalized Normal Constraint (NNC) algorithm</a:t>
+            </a:r>
+            <a:endParaRPr lang="en-US" altLang="en-US" sz="1800"/>
+          </a:p>
+          <a:p>
+            <a:pPr lvl="1"/>
+            <a:r>
+              <a:rPr lang="en-US" altLang="en-US" sz="1800"/>
+              <a:t>Flower Pollination Algorithm</a:t>
+            </a:r>
+            <a:endParaRPr lang="en-US" altLang="en-US" sz="1800"/>
+          </a:p>
+        </p:txBody>
+      </p:sp>
+    </p:spTree>
+  </p:cSld>
+  <p:clrMapOvr>
+    <a:masterClrMapping/>
+  </p:clrMapOvr>
+</p:sld>
+</file>
+
+<file path=ppt/slides/slide17.xml><?xml version="1.0" encoding="utf-8"?>
+<p:sld xmlns:a="http://schemas.openxmlformats.org/drawingml/2006/main" xmlns:r="http://schemas.openxmlformats.org/officeDocument/2006/relationships" xmlns:p="http://schemas.openxmlformats.org/presentationml/2006/main">
+  <p:cSld>
+    <p:spTree>
+      <p:nvGrpSpPr>
+        <p:cNvPr id="1" name=""/>
+        <p:cNvGrpSpPr/>
+        <p:nvPr/>
+      </p:nvGrpSpPr>
+      <p:grpSpPr/>
+      <p:sp>
+        <p:nvSpPr>
+          <p:cNvPr id="2" name="Title 1"/>
+          <p:cNvSpPr>
+            <a:spLocks noGrp="1"/>
+          </p:cNvSpPr>
+          <p:nvPr>
+            <p:ph type="title"/>
+          </p:nvPr>
+        </p:nvSpPr>
+        <p:spPr/>
+        <p:txBody>
+          <a:bodyPr/>
+          <a:p>
+            <a:r>
+              <a:rPr lang="" altLang="en-US"/>
+              <a:t>Verwendungsbereich</a:t>
+            </a:r>
+            <a:endParaRPr lang="" altLang="en-US"/>
+          </a:p>
+        </p:txBody>
+      </p:sp>
+      <p:sp>
+        <p:nvSpPr>
+          <p:cNvPr id="3" name="Content Placeholder 2"/>
+          <p:cNvSpPr>
+            <a:spLocks noGrp="1"/>
+          </p:cNvSpPr>
+          <p:nvPr>
+            <p:ph idx="1"/>
+          </p:nvPr>
+        </p:nvSpPr>
+        <p:spPr/>
+        <p:txBody>
+          <a:bodyPr/>
+          <a:p>
+            <a:endParaRPr lang="" altLang="en-US"/>
+          </a:p>
+        </p:txBody>
+      </p:sp>
+      <p:sp>
+        <p:nvSpPr>
+          <p:cNvPr id="5" name="Slide Number Placeholder 4"/>
+          <p:cNvSpPr>
+            <a:spLocks noGrp="1"/>
+          </p:cNvSpPr>
+          <p:nvPr>
+            <p:ph type="sldNum" sz="quarter" idx="12"/>
+          </p:nvPr>
+        </p:nvSpPr>
+        <p:spPr/>
+        <p:txBody>
+          <a:bodyPr/>
+          <a:p>
+            <a:fld id="{B3561BA9-CDCF-4958-B8AB-66F3BF063E13}" type="slidenum">
+              <a:rPr lang="en-US" smtClean="0"/>
+            </a:fld>
+            <a:endParaRPr lang="en-US"/>
+          </a:p>
+        </p:txBody>
+      </p:sp>
+      <p:pic>
+        <p:nvPicPr>
+          <p:cNvPr id="7" name="Picture 6" descr="uhh_logo_klein"/>
+          <p:cNvPicPr>
+            <a:picLocks noChangeAspect="1"/>
+          </p:cNvPicPr>
+          <p:nvPr/>
+        </p:nvPicPr>
+        <p:blipFill>
+          <a:blip r:embed="rId1"/>
+          <a:stretch>
+            <a:fillRect/>
+          </a:stretch>
+        </p:blipFill>
+        <p:spPr>
+          <a:xfrm>
+            <a:off x="127000" y="6119495"/>
+            <a:ext cx="602615" cy="601980"/>
+          </a:xfrm>
+          <a:prstGeom prst="rect">
+            <a:avLst/>
+          </a:prstGeom>
+        </p:spPr>
+      </p:pic>
+    </p:spTree>
+  </p:cSld>
+  <p:clrMapOvr>
+    <a:masterClrMapping/>
+  </p:clrMapOvr>
+</p:sld>
+</file>
+
+<file path=ppt/slides/slide18.xml><?xml version="1.0" encoding="utf-8"?>
+<p:sld xmlns:a="http://schemas.openxmlformats.org/drawingml/2006/main" xmlns:r="http://schemas.openxmlformats.org/officeDocument/2006/relationships" xmlns:p="http://schemas.openxmlformats.org/presentationml/2006/main">
+  <p:cSld>
+    <p:spTree>
+      <p:nvGrpSpPr>
+        <p:cNvPr id="1" name=""/>
+        <p:cNvGrpSpPr/>
+        <p:nvPr/>
+      </p:nvGrpSpPr>
+      <p:grpSpPr/>
+      <p:sp>
+        <p:nvSpPr>
+          <p:cNvPr id="2" name="Title 1"/>
+          <p:cNvSpPr>
+            <a:spLocks noGrp="1"/>
+          </p:cNvSpPr>
+          <p:nvPr>
+            <p:ph type="title"/>
+          </p:nvPr>
+        </p:nvSpPr>
+        <p:spPr/>
+        <p:txBody>
+          <a:bodyPr/>
+          <a:p>
+            <a:r>
+              <a:rPr lang="en-US"/>
+              <a:t>EA und Optimierung - Vorteile</a:t>
+            </a:r>
+            <a:endParaRPr lang="en-US"/>
+          </a:p>
+        </p:txBody>
+      </p:sp>
+      <p:sp>
+        <p:nvSpPr>
+          <p:cNvPr id="3" name="Content Placeholder 2"/>
+          <p:cNvSpPr>
+            <a:spLocks noGrp="1"/>
+          </p:cNvSpPr>
+          <p:nvPr>
+            <p:ph idx="1"/>
+          </p:nvPr>
+        </p:nvSpPr>
+        <p:spPr/>
+        <p:txBody>
+          <a:bodyPr/>
+          <a:p>
+            <a:r>
+              <a:rPr lang="en-US"/>
+              <a:t>Lösungen </a:t>
+            </a:r>
+            <a:r>
+              <a:rPr lang="" altLang="en-US"/>
+              <a:t>in angemessener Zeit </a:t>
+            </a:r>
+            <a:r>
+              <a:rPr lang="en-US"/>
+              <a:t>finden</a:t>
+            </a:r>
+            <a:r>
+              <a:rPr lang="" altLang="en-US"/>
+              <a:t>.</a:t>
+            </a:r>
+            <a:endParaRPr lang="en-US"/>
+          </a:p>
+          <a:p>
+            <a:pPr marL="0" indent="0">
+              <a:buNone/>
+            </a:pPr>
+            <a:endParaRPr lang="en-US"/>
+          </a:p>
+          <a:p>
+            <a:r>
+              <a:rPr lang="en-US"/>
+              <a:t>Keine Verwendungsbereichgrenze</a:t>
+            </a:r>
+            <a:r>
+              <a:rPr lang="" altLang="en-US"/>
+              <a:t>.</a:t>
+            </a:r>
+            <a:endParaRPr lang="" altLang="en-US"/>
+          </a:p>
+        </p:txBody>
+      </p:sp>
+      <p:sp>
+        <p:nvSpPr>
+          <p:cNvPr id="5" name="Slide Number Placeholder 4"/>
+          <p:cNvSpPr>
+            <a:spLocks noGrp="1"/>
+          </p:cNvSpPr>
+          <p:nvPr>
+            <p:ph type="sldNum" sz="quarter" idx="12"/>
+          </p:nvPr>
+        </p:nvSpPr>
+        <p:spPr/>
+        <p:txBody>
+          <a:bodyPr/>
+          <a:p>
+            <a:fld id="{B3561BA9-CDCF-4958-B8AB-66F3BF063E13}" type="slidenum">
+              <a:rPr lang="en-US" smtClean="0"/>
+            </a:fld>
+            <a:endParaRPr lang="en-US"/>
+          </a:p>
+        </p:txBody>
+      </p:sp>
+      <p:pic>
+        <p:nvPicPr>
+          <p:cNvPr id="7" name="Picture 6" descr="uhh_logo_klein"/>
+          <p:cNvPicPr>
+            <a:picLocks noChangeAspect="1"/>
+          </p:cNvPicPr>
+          <p:nvPr/>
+        </p:nvPicPr>
+        <p:blipFill>
+          <a:blip r:embed="rId1"/>
+          <a:stretch>
+            <a:fillRect/>
+          </a:stretch>
+        </p:blipFill>
+        <p:spPr>
+          <a:xfrm>
+            <a:off x="127000" y="6119495"/>
+            <a:ext cx="602615" cy="601980"/>
+          </a:xfrm>
+          <a:prstGeom prst="rect">
+            <a:avLst/>
+          </a:prstGeom>
+        </p:spPr>
+      </p:pic>
+    </p:spTree>
+  </p:cSld>
+  <p:clrMapOvr>
+    <a:masterClrMapping/>
+  </p:clrMapOvr>
+</p:sld>
+</file>
+
+<file path=ppt/slides/slide19.xml><?xml version="1.0" encoding="utf-8"?>
+<p:sld xmlns:a="http://schemas.openxmlformats.org/drawingml/2006/main" xmlns:r="http://schemas.openxmlformats.org/officeDocument/2006/relationships" xmlns:p="http://schemas.openxmlformats.org/presentationml/2006/main">
+  <p:cSld>
+    <p:spTree>
+      <p:nvGrpSpPr>
+        <p:cNvPr id="1" name=""/>
+        <p:cNvGrpSpPr/>
+        <p:nvPr/>
+      </p:nvGrpSpPr>
+      <p:grpSpPr/>
+      <p:sp>
+        <p:nvSpPr>
+          <p:cNvPr id="2" name="Title 1"/>
+          <p:cNvSpPr>
+            <a:spLocks noGrp="1"/>
+          </p:cNvSpPr>
+          <p:nvPr>
+            <p:ph type="title"/>
+          </p:nvPr>
+        </p:nvSpPr>
+        <p:spPr/>
+        <p:txBody>
+          <a:bodyPr/>
+          <a:p>
+            <a:r>
+              <a:rPr lang="en-US"/>
+              <a:t>EA und Optimierung - </a:t>
+            </a:r>
+            <a:r>
+              <a:rPr lang="en-US" altLang="en-US"/>
+              <a:t>Nachteile</a:t>
+            </a:r>
+            <a:endParaRPr lang="en-US" altLang="en-US"/>
+          </a:p>
+        </p:txBody>
+      </p:sp>
+      <p:sp>
+        <p:nvSpPr>
+          <p:cNvPr id="3" name="Content Placeholder 2"/>
+          <p:cNvSpPr>
+            <a:spLocks noGrp="1"/>
+          </p:cNvSpPr>
+          <p:nvPr>
+            <p:ph idx="1"/>
+          </p:nvPr>
+        </p:nvSpPr>
+        <p:spPr/>
+        <p:txBody>
+          <a:bodyPr/>
+          <a:p>
+            <a:r>
+              <a:rPr lang="en-US" altLang="en-US" b="1"/>
+              <a:t>Gute</a:t>
+            </a:r>
+            <a:r>
+              <a:rPr lang="en-US" altLang="en-US"/>
+              <a:t> Lösungen, wahrscheinlich nicht die beste.</a:t>
+            </a:r>
+            <a:endParaRPr lang="en-US" altLang="en-US"/>
+          </a:p>
+          <a:p>
+            <a:pPr marL="0" indent="0">
+              <a:buNone/>
+            </a:pPr>
+            <a:endParaRPr lang="en-US" altLang="en-US"/>
+          </a:p>
+          <a:p>
+            <a:r>
+              <a:rPr lang="en-US" altLang="en-US">
+                <a:sym typeface="+mn-ea"/>
+              </a:rPr>
+              <a:t>Definition </a:t>
+            </a:r>
+            <a:r>
+              <a:rPr lang="" altLang="en-US">
+                <a:sym typeface="+mn-ea"/>
+              </a:rPr>
+              <a:t>der </a:t>
+            </a:r>
+            <a:r>
+              <a:rPr lang="" altLang="en-US"/>
+              <a:t>Zielfunktion.</a:t>
+            </a:r>
+            <a:endParaRPr lang="" altLang="en-US"/>
+          </a:p>
+          <a:p>
+            <a:pPr marL="0" indent="0">
+              <a:buNone/>
+            </a:pPr>
+            <a:endParaRPr lang="" altLang="en-US"/>
+          </a:p>
+          <a:p>
+            <a:r>
+              <a:rPr lang="en-US" altLang="en-US"/>
+              <a:t>Parameter Einstellung.</a:t>
+            </a:r>
+            <a:endParaRPr lang="en-US" altLang="en-US"/>
+          </a:p>
+        </p:txBody>
+      </p:sp>
+      <p:sp>
+        <p:nvSpPr>
+          <p:cNvPr id="5" name="Slide Number Placeholder 4"/>
+          <p:cNvSpPr>
+            <a:spLocks noGrp="1"/>
+          </p:cNvSpPr>
+          <p:nvPr>
+            <p:ph type="sldNum" sz="quarter" idx="12"/>
+          </p:nvPr>
+        </p:nvSpPr>
+        <p:spPr/>
+        <p:txBody>
+          <a:bodyPr/>
+          <a:p>
+            <a:fld id="{B3561BA9-CDCF-4958-B8AB-66F3BF063E13}" type="slidenum">
+              <a:rPr lang="en-US" smtClean="0"/>
+            </a:fld>
+            <a:endParaRPr lang="en-US"/>
+          </a:p>
+        </p:txBody>
+      </p:sp>
+      <p:pic>
+        <p:nvPicPr>
+          <p:cNvPr id="7" name="Picture 6" descr="uhh_logo_klein"/>
+          <p:cNvPicPr>
+            <a:picLocks noChangeAspect="1"/>
+          </p:cNvPicPr>
+          <p:nvPr/>
+        </p:nvPicPr>
+        <p:blipFill>
+          <a:blip r:embed="rId1"/>
+          <a:stretch>
+            <a:fillRect/>
+          </a:stretch>
+        </p:blipFill>
+        <p:spPr>
+          <a:xfrm>
+            <a:off x="127000" y="6119495"/>
+            <a:ext cx="602615" cy="601980"/>
+          </a:xfrm>
+          <a:prstGeom prst="rect">
+            <a:avLst/>
+          </a:prstGeom>
+        </p:spPr>
+      </p:pic>
+    </p:spTree>
+  </p:cSld>
+  <p:clrMapOvr>
+    <a:masterClrMapping/>
+  </p:clrMapOvr>
+</p:sld>
+</file>
+
 <file path=ppt/slides/slide2.xml><?xml version="1.0" encoding="utf-8"?>
 <p:sld xmlns:a="http://schemas.openxmlformats.org/drawingml/2006/main" xmlns:r="http://schemas.openxmlformats.org/officeDocument/2006/relationships" xmlns:p="http://schemas.openxmlformats.org/presentationml/2006/main">
   <p:cSld>
@@ -3429,6 +5875,10 @@
         <p:txBody>
           <a:bodyPr/>
           <a:p>
+            <a:r>
+              <a:rPr lang="en-US"/>
+              <a:t>Übersicht</a:t>
+            </a:r>
             <a:endParaRPr lang="en-US"/>
           </a:p>
         </p:txBody>
@@ -3443,79 +5893,217 @@
             <p:ph idx="1"/>
           </p:nvPr>
         </p:nvSpPr>
-        <p:spPr/>
-        <p:txBody>
-          <a:bodyPr/>
-          <a:p>
+        <p:spPr>
+          <a:xfrm>
+            <a:off x="863600" y="1825625"/>
+            <a:ext cx="10515600" cy="4351338"/>
+          </a:xfrm>
+        </p:spPr>
+        <p:txBody>
+          <a:bodyPr/>
+          <a:p>
+            <a:r>
+              <a:rPr lang="en-US" altLang="en-US" sz="2400"/>
+              <a:t>Optimierung</a:t>
+            </a:r>
+            <a:endParaRPr lang="en-US" altLang="en-US" sz="2400"/>
+          </a:p>
+          <a:p>
+            <a:pPr lvl="1"/>
+            <a:r>
+              <a:rPr lang="" altLang="en-US" sz="2055"/>
+              <a:t>Definition</a:t>
+            </a:r>
+            <a:endParaRPr lang="" altLang="en-US" sz="2055"/>
+          </a:p>
+          <a:p>
+            <a:pPr lvl="1"/>
+            <a:r>
+              <a:rPr lang="" altLang="en-US" sz="2055"/>
+              <a:t>Arten</a:t>
+            </a:r>
+            <a:endParaRPr lang="en-US" altLang="en-US" sz="1760"/>
+          </a:p>
+          <a:p>
+            <a:pPr lvl="0"/>
+            <a:r>
+              <a:rPr lang="en-US" altLang="en-US" sz="2400"/>
+              <a:t>Evolutionäre Algorithmen</a:t>
+            </a:r>
+            <a:endParaRPr lang="en-US" altLang="en-US" sz="2790"/>
+          </a:p>
+          <a:p>
+            <a:pPr lvl="1"/>
+            <a:r>
+              <a:rPr lang="en-US" altLang="en-US" sz="2060"/>
+              <a:t>Definition</a:t>
+            </a:r>
+            <a:endParaRPr lang="en-US" altLang="en-US" sz="2060"/>
+          </a:p>
+          <a:p>
+            <a:pPr lvl="1"/>
+            <a:r>
+              <a:rPr lang="" altLang="en-US" sz="2060"/>
+              <a:t>Merkmale</a:t>
+            </a:r>
+            <a:endParaRPr lang="en-US" altLang="en-US" sz="2060"/>
+          </a:p>
+          <a:p>
+            <a:pPr lvl="1"/>
+            <a:r>
+              <a:rPr lang="en-US" altLang="en-US" sz="2060"/>
+              <a:t>Beispiele</a:t>
+            </a:r>
+            <a:endParaRPr lang="en-US" altLang="en-US" sz="2060"/>
+          </a:p>
+          <a:p>
+            <a:pPr lvl="0"/>
+            <a:r>
+              <a:rPr lang="en-US" altLang="en-US" sz="2400"/>
+              <a:t>Evolutionäre </a:t>
+            </a:r>
             <a:r>
               <a:rPr lang="" altLang="en-US" sz="2400"/>
-              <a:t>Optimierung</a:t>
-            </a:r>
-            <a:endParaRPr lang="" altLang="en-US" sz="2400"/>
-          </a:p>
-          <a:p>
-            <a:pPr lvl="1"/>
-            <a:r>
-              <a:rPr lang="" altLang="en-US" sz="2055"/>
-              <a:t>Wichtigkeit</a:t>
-            </a:r>
-            <a:endParaRPr lang="" altLang="en-US" sz="2055"/>
-          </a:p>
-          <a:p>
-            <a:pPr lvl="1"/>
-            <a:r>
-              <a:rPr lang="" altLang="en-US" sz="2055"/>
-              <a:t>Schwierigketi</a:t>
-            </a:r>
-            <a:endParaRPr lang="" altLang="en-US" sz="2055"/>
+              <a:t>Algorithmen</a:t>
+            </a:r>
+            <a:r>
+              <a:rPr lang="en-US" altLang="en-US" sz="2400"/>
+              <a:t> Vor- und Nachteile</a:t>
+            </a:r>
+            <a:endParaRPr lang="en-US" altLang="en-US" sz="2400"/>
           </a:p>
           <a:p>
             <a:pPr lvl="0"/>
             <a:r>
+              <a:rPr lang="en-US" altLang="en-US" sz="2400"/>
+              <a:t>Zusammenfas</a:t>
+            </a:r>
+            <a:r>
               <a:rPr lang="" altLang="en-US" sz="2400"/>
-              <a:t>Evolutionäre Algorithmen</a:t>
-            </a:r>
-            <a:endParaRPr lang="" altLang="en-US" sz="2790"/>
-          </a:p>
-          <a:p>
-            <a:pPr lvl="1"/>
-            <a:r>
-              <a:rPr lang="" altLang="en-US" sz="2060"/>
-              <a:t>Definition</a:t>
-            </a:r>
-            <a:endParaRPr lang="" altLang="en-US" sz="2060"/>
-          </a:p>
-          <a:p>
-            <a:pPr lvl="1"/>
-            <a:r>
-              <a:rPr lang="" altLang="en-US" sz="2060"/>
-              <a:t>Eigenschaften</a:t>
-            </a:r>
-            <a:endParaRPr lang="" altLang="en-US" sz="2060"/>
-          </a:p>
-          <a:p>
-            <a:pPr lvl="1"/>
-            <a:r>
-              <a:rPr lang="" altLang="en-US" sz="2060"/>
-              <a:t>Beispiele</a:t>
-            </a:r>
-            <a:endParaRPr lang="" altLang="en-US" sz="2060"/>
-          </a:p>
-          <a:p>
-            <a:pPr lvl="0"/>
-            <a:r>
-              <a:rPr lang="" altLang="en-US" sz="2400"/>
-              <a:t>Evolutionäre Algorithmen und Optimierung - Vor- und Nachteile</a:t>
-            </a:r>
-            <a:endParaRPr lang="" altLang="en-US" sz="2400"/>
-          </a:p>
-          <a:p>
-            <a:pPr lvl="0"/>
-            <a:r>
-              <a:rPr lang="" altLang="en-US" sz="2400"/>
-              <a:t>Zusammenfasung</a:t>
-            </a:r>
-            <a:endParaRPr lang="" altLang="en-US" sz="2400"/>
+              <a:t>s</a:t>
+            </a:r>
+            <a:r>
+              <a:rPr lang="en-US" altLang="en-US" sz="2400"/>
+              <a:t>ung</a:t>
+            </a:r>
+            <a:endParaRPr lang="en-US" altLang="en-US" sz="2400"/>
+          </a:p>
+        </p:txBody>
+      </p:sp>
+      <p:sp>
+        <p:nvSpPr>
+          <p:cNvPr id="5" name="Slide Number Placeholder 4"/>
+          <p:cNvSpPr>
+            <a:spLocks noGrp="1"/>
+          </p:cNvSpPr>
+          <p:nvPr>
+            <p:ph type="sldNum" sz="quarter" idx="12"/>
+          </p:nvPr>
+        </p:nvSpPr>
+        <p:spPr/>
+        <p:txBody>
+          <a:bodyPr/>
+          <a:p>
+            <a:fld id="{B3561BA9-CDCF-4958-B8AB-66F3BF063E13}" type="slidenum">
+              <a:rPr lang="en-US" smtClean="0"/>
+            </a:fld>
+            <a:endParaRPr lang="en-US"/>
+          </a:p>
+        </p:txBody>
+      </p:sp>
+      <p:pic>
+        <p:nvPicPr>
+          <p:cNvPr id="7" name="Picture 6" descr="uhh_logo_klein"/>
+          <p:cNvPicPr>
+            <a:picLocks noChangeAspect="1"/>
+          </p:cNvPicPr>
+          <p:nvPr/>
+        </p:nvPicPr>
+        <p:blipFill>
+          <a:blip r:embed="rId1"/>
+          <a:stretch>
+            <a:fillRect/>
+          </a:stretch>
+        </p:blipFill>
+        <p:spPr>
+          <a:xfrm>
+            <a:off x="127000" y="6119495"/>
+            <a:ext cx="602615" cy="601980"/>
+          </a:xfrm>
+          <a:prstGeom prst="rect">
+            <a:avLst/>
+          </a:prstGeom>
+        </p:spPr>
+      </p:pic>
+    </p:spTree>
+  </p:cSld>
+  <p:clrMapOvr>
+    <a:masterClrMapping/>
+  </p:clrMapOvr>
+</p:sld>
+</file>
+
+<file path=ppt/slides/slide20.xml><?xml version="1.0" encoding="utf-8"?>
+<p:sld xmlns:a="http://schemas.openxmlformats.org/drawingml/2006/main" xmlns:r="http://schemas.openxmlformats.org/officeDocument/2006/relationships" xmlns:p="http://schemas.openxmlformats.org/presentationml/2006/main">
+  <p:cSld>
+    <p:spTree>
+      <p:nvGrpSpPr>
+        <p:cNvPr id="1" name=""/>
+        <p:cNvGrpSpPr/>
+        <p:nvPr/>
+      </p:nvGrpSpPr>
+      <p:grpSpPr/>
+      <p:sp>
+        <p:nvSpPr>
+          <p:cNvPr id="2" name="Title 1"/>
+          <p:cNvSpPr>
+            <a:spLocks noGrp="1"/>
+          </p:cNvSpPr>
+          <p:nvPr>
+            <p:ph type="title"/>
+          </p:nvPr>
+        </p:nvSpPr>
+        <p:spPr/>
+        <p:txBody>
+          <a:bodyPr/>
+          <a:p>
+            <a:r>
+              <a:rPr lang="" altLang="en-US"/>
+              <a:t>Zusammenfassung</a:t>
+            </a:r>
+            <a:endParaRPr lang="" altLang="en-US"/>
+          </a:p>
+        </p:txBody>
+      </p:sp>
+      <p:sp>
+        <p:nvSpPr>
+          <p:cNvPr id="3" name="Content Placeholder 2"/>
+          <p:cNvSpPr>
+            <a:spLocks noGrp="1"/>
+          </p:cNvSpPr>
+          <p:nvPr>
+            <p:ph idx="1"/>
+          </p:nvPr>
+        </p:nvSpPr>
+        <p:spPr/>
+        <p:txBody>
+          <a:bodyPr/>
+          <a:p>
+            <a:r>
+              <a:rPr lang="" altLang="en-US"/>
+              <a:t>Optimierung stellt ein schwieriges Problem dar.</a:t>
+            </a:r>
+            <a:endParaRPr lang="" altLang="en-US"/>
+          </a:p>
+          <a:p>
+            <a:endParaRPr lang="" altLang="en-US"/>
+          </a:p>
+          <a:p>
+            <a:r>
+              <a:rPr lang="" altLang="en-US"/>
+              <a:t>Evolutionäre Algorithmen sind ein vorteilhaftes Werkzeug.</a:t>
+            </a:r>
+            <a:endParaRPr lang="" altLang="en-US"/>
           </a:p>
         </p:txBody>
       </p:sp>
@@ -3597,10 +6185,10 @@
           <a:bodyPr/>
           <a:p>
             <a:r>
-              <a:rPr lang="" altLang="en-US"/>
+              <a:rPr lang="en-US" altLang="en-US"/>
               <a:t>Was ist Optimierung?</a:t>
             </a:r>
-            <a:endParaRPr lang="" altLang="en-US"/>
+            <a:endParaRPr lang="en-US" altLang="en-US"/>
           </a:p>
         </p:txBody>
       </p:sp>
@@ -3700,8 +6288,8 @@
           <a:bodyPr/>
           <a:p>
             <a:r>
-              <a:rPr lang="" altLang="en-US"/>
-              <a:t>Warum ist Optimierung wichtig?</a:t>
+              <a:rPr lang="en-US" altLang="en-US"/>
+              <a:t>Was ist Optimierung?</a:t>
             </a:r>
             <a:endParaRPr lang="" altLang="en-US"/>
           </a:p>
@@ -3721,7 +6309,7 @@
         <p:txBody>
           <a:bodyPr/>
           <a:p>
-            <a:endParaRPr lang="en-US"/>
+            <a:endParaRPr lang="" altLang="en-US"/>
           </a:p>
         </p:txBody>
       </p:sp>
@@ -3803,36 +6391,14 @@
           <a:bodyPr/>
           <a:p>
             <a:r>
+              <a:rPr lang="" altLang="en-US"/>
+              <a:t>Arten der</a:t>
+            </a:r>
+            <a:r>
               <a:rPr lang="en-US" altLang="en-US"/>
-              <a:t>Warum ist Optimierung </a:t>
-            </a:r>
-            <a:r>
-              <a:rPr lang="" altLang="en-US"/>
-              <a:t>schwierig</a:t>
-            </a:r>
-            <a:r>
-              <a:rPr lang="en-US" altLang="en-US"/>
-              <a:t>?</a:t>
+              <a:t> Optimierung</a:t>
             </a:r>
             <a:endParaRPr lang="en-US" altLang="en-US"/>
-          </a:p>
-        </p:txBody>
-      </p:sp>
-      <p:sp>
-        <p:nvSpPr>
-          <p:cNvPr id="3" name="Content Placeholder 2"/>
-          <p:cNvSpPr>
-            <a:spLocks noGrp="1"/>
-          </p:cNvSpPr>
-          <p:nvPr>
-            <p:ph idx="1"/>
-          </p:nvPr>
-        </p:nvSpPr>
-        <p:spPr/>
-        <p:txBody>
-          <a:bodyPr/>
-          <a:p>
-            <a:endParaRPr lang="en-US"/>
           </a:p>
         </p:txBody>
       </p:sp>
@@ -3881,6 +6447,59 @@
           </a:prstGeom>
         </p:spPr>
       </p:pic>
+      <p:pic>
+        <p:nvPicPr>
+          <p:cNvPr id="4" name="Picture 3" descr="simple_optimization"/>
+          <p:cNvPicPr>
+            <a:picLocks noChangeAspect="1"/>
+          </p:cNvPicPr>
+          <p:nvPr/>
+        </p:nvPicPr>
+        <p:blipFill>
+          <a:blip r:embed="rId2"/>
+          <a:stretch>
+            <a:fillRect/>
+          </a:stretch>
+        </p:blipFill>
+        <p:spPr>
+          <a:xfrm>
+            <a:off x="3187065" y="1553845"/>
+            <a:ext cx="7202805" cy="4802505"/>
+          </a:xfrm>
+          <a:prstGeom prst="rect">
+            <a:avLst/>
+          </a:prstGeom>
+        </p:spPr>
+      </p:pic>
+      <p:sp>
+        <p:nvSpPr>
+          <p:cNvPr id="6" name="Text Box 5"/>
+          <p:cNvSpPr txBox="1"/>
+          <p:nvPr/>
+        </p:nvSpPr>
+        <p:spPr>
+          <a:xfrm>
+            <a:off x="501650" y="2230755"/>
+            <a:ext cx="1540510" cy="460375"/>
+          </a:xfrm>
+          <a:prstGeom prst="rect">
+            <a:avLst/>
+          </a:prstGeom>
+          <a:noFill/>
+        </p:spPr>
+        <p:txBody>
+          <a:bodyPr wrap="square" rtlCol="0">
+            <a:spAutoFit/>
+          </a:bodyPr>
+          <a:p>
+            <a:r>
+              <a:rPr lang="" altLang="en-US" sz="2400"/>
+              <a:t>Einfach</a:t>
+            </a:r>
+            <a:endParaRPr lang="" altLang="en-US" sz="2400"/>
+          </a:p>
+        </p:txBody>
+      </p:sp>
     </p:spTree>
   </p:cSld>
   <p:clrMapOvr>
@@ -3911,34 +6530,23 @@
         </p:nvSpPr>
         <p:spPr/>
         <p:txBody>
-          <a:bodyPr>
-            <a:normAutofit fontScale="90000"/>
-          </a:bodyPr>
-          <a:p>
-            <a:r>
-              <a:rPr lang="" altLang="en-US"/>
-              <a:t>Was ist ein ,,evolutionärer” Algorithmus?</a:t>
-            </a:r>
-            <a:endParaRPr lang="" altLang="en-US"/>
-          </a:p>
-        </p:txBody>
-      </p:sp>
-      <p:sp>
-        <p:nvSpPr>
-          <p:cNvPr id="3" name="Content Placeholder 2"/>
-          <p:cNvSpPr>
-            <a:spLocks noGrp="1"/>
-          </p:cNvSpPr>
-          <p:nvPr>
-            <p:ph idx="1"/>
-          </p:nvPr>
-        </p:nvSpPr>
-        <p:spPr/>
-        <p:txBody>
-          <a:bodyPr/>
-          <a:p>
-            <a:pPr lvl="1"/>
-            <a:endParaRPr lang="en-US"/>
+          <a:bodyPr/>
+          <a:p>
+            <a:r>
+              <a:rPr lang="en-US" altLang="en-US">
+                <a:sym typeface="+mn-ea"/>
+              </a:rPr>
+              <a:t>Arten der Optimierung </a:t>
+            </a:r>
+            <a:r>
+              <a:rPr lang="" altLang="en-US">
+                <a:sym typeface="+mn-ea"/>
+              </a:rPr>
+              <a:t>(fort.)</a:t>
+            </a:r>
+            <a:endParaRPr lang="" altLang="en-US">
+              <a:sym typeface="+mn-ea"/>
+            </a:endParaRPr>
           </a:p>
         </p:txBody>
       </p:sp>
@@ -3987,6 +6595,59 @@
           </a:prstGeom>
         </p:spPr>
       </p:pic>
+      <p:pic>
+        <p:nvPicPr>
+          <p:cNvPr id="4" name="Picture 3" descr="constricted_optimization"/>
+          <p:cNvPicPr>
+            <a:picLocks noChangeAspect="1"/>
+          </p:cNvPicPr>
+          <p:nvPr/>
+        </p:nvPicPr>
+        <p:blipFill>
+          <a:blip r:embed="rId2"/>
+          <a:stretch>
+            <a:fillRect/>
+          </a:stretch>
+        </p:blipFill>
+        <p:spPr>
+          <a:xfrm>
+            <a:off x="2529205" y="1564005"/>
+            <a:ext cx="8518525" cy="4792345"/>
+          </a:xfrm>
+          <a:prstGeom prst="rect">
+            <a:avLst/>
+          </a:prstGeom>
+        </p:spPr>
+      </p:pic>
+      <p:sp>
+        <p:nvSpPr>
+          <p:cNvPr id="6" name="Text Box 5"/>
+          <p:cNvSpPr txBox="1"/>
+          <p:nvPr/>
+        </p:nvSpPr>
+        <p:spPr>
+          <a:xfrm>
+            <a:off x="382905" y="2263775"/>
+            <a:ext cx="2446020" cy="460375"/>
+          </a:xfrm>
+          <a:prstGeom prst="rect">
+            <a:avLst/>
+          </a:prstGeom>
+          <a:noFill/>
+        </p:spPr>
+        <p:txBody>
+          <a:bodyPr wrap="square" rtlCol="0">
+            <a:spAutoFit/>
+          </a:bodyPr>
+          <a:p>
+            <a:r>
+              <a:rPr lang="" altLang="en-US" sz="2400"/>
+              <a:t>Eingeschränkt</a:t>
+            </a:r>
+            <a:endParaRPr lang="" altLang="en-US" sz="2400"/>
+          </a:p>
+        </p:txBody>
+      </p:sp>
     </p:spTree>
   </p:cSld>
   <p:clrMapOvr>
@@ -4020,28 +6681,12 @@
           <a:bodyPr/>
           <a:p>
             <a:r>
-              <a:rPr lang="en-US"/>
-              <a:t>EA und Optimierung - Vorteile</a:t>
-            </a:r>
-            <a:endParaRPr lang="en-US"/>
-          </a:p>
-        </p:txBody>
-      </p:sp>
-      <p:sp>
-        <p:nvSpPr>
-          <p:cNvPr id="3" name="Content Placeholder 2"/>
-          <p:cNvSpPr>
-            <a:spLocks noGrp="1"/>
-          </p:cNvSpPr>
-          <p:nvPr>
-            <p:ph idx="1"/>
-          </p:nvPr>
-        </p:nvSpPr>
-        <p:spPr/>
-        <p:txBody>
-          <a:bodyPr/>
-          <a:p>
-            <a:endParaRPr lang="en-US"/>
+              <a:rPr lang="en-US" altLang="en-US">
+                <a:sym typeface="+mn-ea"/>
+              </a:rPr>
+              <a:t>Arten der Optimierung (fort.)</a:t>
+            </a:r>
+            <a:endParaRPr lang="en-US" altLang="en-US"/>
           </a:p>
         </p:txBody>
       </p:sp>
@@ -4090,6 +6735,59 @@
           </a:prstGeom>
         </p:spPr>
       </p:pic>
+      <p:pic>
+        <p:nvPicPr>
+          <p:cNvPr id="4" name="Picture 3" descr="multi_objective_optimization"/>
+          <p:cNvPicPr>
+            <a:picLocks noChangeAspect="1"/>
+          </p:cNvPicPr>
+          <p:nvPr/>
+        </p:nvPicPr>
+        <p:blipFill>
+          <a:blip r:embed="rId2"/>
+          <a:stretch>
+            <a:fillRect/>
+          </a:stretch>
+        </p:blipFill>
+        <p:spPr>
+          <a:xfrm>
+            <a:off x="3204845" y="1576705"/>
+            <a:ext cx="7203440" cy="4802505"/>
+          </a:xfrm>
+          <a:prstGeom prst="rect">
+            <a:avLst/>
+          </a:prstGeom>
+        </p:spPr>
+      </p:pic>
+      <p:sp>
+        <p:nvSpPr>
+          <p:cNvPr id="8" name="Text Box 7"/>
+          <p:cNvSpPr txBox="1"/>
+          <p:nvPr/>
+        </p:nvSpPr>
+        <p:spPr>
+          <a:xfrm>
+            <a:off x="343535" y="2260600"/>
+            <a:ext cx="2487295" cy="460375"/>
+          </a:xfrm>
+          <a:prstGeom prst="rect">
+            <a:avLst/>
+          </a:prstGeom>
+          <a:noFill/>
+        </p:spPr>
+        <p:txBody>
+          <a:bodyPr wrap="square" rtlCol="0">
+            <a:spAutoFit/>
+          </a:bodyPr>
+          <a:p>
+            <a:r>
+              <a:rPr lang="" altLang="en-US" sz="2400"/>
+              <a:t>Multi-objective</a:t>
+            </a:r>
+            <a:endParaRPr lang="" altLang="en-US" sz="2400"/>
+          </a:p>
+        </p:txBody>
+      </p:sp>
     </p:spTree>
   </p:cSld>
   <p:clrMapOvr>
@@ -4123,14 +6821,152 @@
           <a:bodyPr/>
           <a:p>
             <a:r>
-              <a:rPr lang="en-US"/>
-              <a:t>EA und Optimierung - </a:t>
-            </a:r>
-            <a:r>
-              <a:rPr lang="" altLang="en-US"/>
-              <a:t>Nachteile</a:t>
-            </a:r>
-            <a:endParaRPr lang="" altLang="en-US"/>
+              <a:rPr lang="en-US" altLang="en-US">
+                <a:sym typeface="+mn-ea"/>
+              </a:rPr>
+              <a:t>Arten der Optimierung (fort.)</a:t>
+            </a:r>
+            <a:endParaRPr lang="en-US" altLang="en-US"/>
+          </a:p>
+        </p:txBody>
+      </p:sp>
+      <p:sp>
+        <p:nvSpPr>
+          <p:cNvPr id="5" name="Slide Number Placeholder 4"/>
+          <p:cNvSpPr>
+            <a:spLocks noGrp="1"/>
+          </p:cNvSpPr>
+          <p:nvPr>
+            <p:ph type="sldNum" sz="quarter" idx="12"/>
+          </p:nvPr>
+        </p:nvSpPr>
+        <p:spPr/>
+        <p:txBody>
+          <a:bodyPr/>
+          <a:p>
+            <a:fld id="{B3561BA9-CDCF-4958-B8AB-66F3BF063E13}" type="slidenum">
+              <a:rPr lang="en-US" smtClean="0"/>
+            </a:fld>
+            <a:endParaRPr lang="en-US"/>
+          </a:p>
+        </p:txBody>
+      </p:sp>
+      <p:pic>
+        <p:nvPicPr>
+          <p:cNvPr id="7" name="Picture 6" descr="uhh_logo_klein"/>
+          <p:cNvPicPr>
+            <a:picLocks noChangeAspect="1"/>
+          </p:cNvPicPr>
+          <p:nvPr/>
+        </p:nvPicPr>
+        <p:blipFill>
+          <a:blip r:embed="rId1"/>
+          <a:stretch>
+            <a:fillRect/>
+          </a:stretch>
+        </p:blipFill>
+        <p:spPr>
+          <a:xfrm>
+            <a:off x="127000" y="6119495"/>
+            <a:ext cx="602615" cy="601980"/>
+          </a:xfrm>
+          <a:prstGeom prst="rect">
+            <a:avLst/>
+          </a:prstGeom>
+        </p:spPr>
+      </p:pic>
+      <p:pic>
+        <p:nvPicPr>
+          <p:cNvPr id="4" name="Picture 3" descr="rastrigin_function"/>
+          <p:cNvPicPr>
+            <a:picLocks noChangeAspect="1"/>
+          </p:cNvPicPr>
+          <p:nvPr/>
+        </p:nvPicPr>
+        <p:blipFill>
+          <a:blip r:embed="rId2"/>
+          <a:stretch>
+            <a:fillRect/>
+          </a:stretch>
+        </p:blipFill>
+        <p:spPr>
+          <a:xfrm>
+            <a:off x="2826385" y="1379220"/>
+            <a:ext cx="8839200" cy="4841875"/>
+          </a:xfrm>
+          <a:prstGeom prst="rect">
+            <a:avLst/>
+          </a:prstGeom>
+        </p:spPr>
+      </p:pic>
+      <p:sp>
+        <p:nvSpPr>
+          <p:cNvPr id="6" name="Text Box 5"/>
+          <p:cNvSpPr txBox="1"/>
+          <p:nvPr/>
+        </p:nvSpPr>
+        <p:spPr>
+          <a:xfrm>
+            <a:off x="404495" y="2261870"/>
+            <a:ext cx="2527300" cy="460375"/>
+          </a:xfrm>
+          <a:prstGeom prst="rect">
+            <a:avLst/>
+          </a:prstGeom>
+          <a:noFill/>
+        </p:spPr>
+        <p:txBody>
+          <a:bodyPr wrap="square" rtlCol="0">
+            <a:spAutoFit/>
+          </a:bodyPr>
+          <a:p>
+            <a:r>
+              <a:rPr lang="" altLang="en-US" sz="2400"/>
+              <a:t>Multi-modal</a:t>
+            </a:r>
+            <a:endParaRPr lang="" altLang="en-US" sz="2400"/>
+          </a:p>
+        </p:txBody>
+      </p:sp>
+    </p:spTree>
+  </p:cSld>
+  <p:clrMapOvr>
+    <a:masterClrMapping/>
+  </p:clrMapOvr>
+</p:sld>
+</file>
+
+<file path=ppt/slides/slide9.xml><?xml version="1.0" encoding="utf-8"?>
+<p:sld xmlns:a="http://schemas.openxmlformats.org/drawingml/2006/main" xmlns:r="http://schemas.openxmlformats.org/officeDocument/2006/relationships" xmlns:p="http://schemas.openxmlformats.org/presentationml/2006/main">
+  <p:cSld>
+    <p:spTree>
+      <p:nvGrpSpPr>
+        <p:cNvPr id="1" name=""/>
+        <p:cNvGrpSpPr/>
+        <p:nvPr/>
+      </p:nvGrpSpPr>
+      <p:grpSpPr/>
+      <p:sp>
+        <p:nvSpPr>
+          <p:cNvPr id="2" name="Title 1"/>
+          <p:cNvSpPr>
+            <a:spLocks noGrp="1"/>
+          </p:cNvSpPr>
+          <p:nvPr>
+            <p:ph type="title"/>
+          </p:nvPr>
+        </p:nvSpPr>
+        <p:spPr/>
+        <p:txBody>
+          <a:bodyPr>
+            <a:normAutofit fontScale="90000"/>
+          </a:bodyPr>
+          <a:p>
+            <a:r>
+              <a:rPr lang="en-US" altLang="en-US"/>
+              <a:t>Was ist ein ,,evolutionärer” Algorithmus?</a:t>
+            </a:r>
+            <a:endParaRPr lang="en-US" altLang="en-US"/>
           </a:p>
         </p:txBody>
       </p:sp>
@@ -4148,22 +6984,8 @@
         <p:txBody>
           <a:bodyPr/>
           <a:p>
-            <a:r>
-              <a:rPr lang="" altLang="en-US" b="1"/>
-              <a:t>Gute</a:t>
-            </a:r>
-            <a:r>
-              <a:rPr lang="" altLang="en-US"/>
-              <a:t> Lösungen, wahrscheinlich nicht die beste.</a:t>
-            </a:r>
-            <a:endParaRPr lang="" altLang="en-US"/>
-          </a:p>
-          <a:p>
-            <a:r>
-              <a:rPr lang="" altLang="en-US"/>
-              <a:t>Parameter Einstellung.</a:t>
-            </a:r>
-            <a:endParaRPr lang="" altLang="en-US"/>
+            <a:pPr lvl="1"/>
+            <a:endParaRPr lang="en-US"/>
           </a:p>
         </p:txBody>
       </p:sp>

</xml_diff>